<commit_message>
Almost finished, let's go Theo
</commit_message>
<xml_diff>
--- a/figures/churn_diagram.pptx
+++ b/figures/churn_diagram.pptx
@@ -7,14 +7,14 @@
   <p:sldIdLst>
     <p:sldId id="256" r:id="rId2"/>
   </p:sldIdLst>
-  <p:sldSz cx="9361488" cy="9361488"/>
+  <p:sldSz cx="12241213" cy="6121400"/>
   <p:notesSz cx="6858000" cy="9144000"/>
   <p:defaultTextStyle>
     <a:defPPr>
       <a:defRPr lang="en-US"/>
     </a:defPPr>
-    <a:lvl1pPr marL="0" algn="l" defTabSz="1069708" rtl="0" eaLnBrk="1" latinLnBrk="0" hangingPunct="1">
-      <a:defRPr sz="2100" kern="1200">
+    <a:lvl1pPr marL="0" algn="l" defTabSz="1213628" rtl="0" eaLnBrk="1" latinLnBrk="0" hangingPunct="1">
+      <a:defRPr sz="2400" kern="1200">
         <a:solidFill>
           <a:schemeClr val="tx1"/>
         </a:solidFill>
@@ -23,8 +23,8 @@
         <a:cs typeface="+mn-cs"/>
       </a:defRPr>
     </a:lvl1pPr>
-    <a:lvl2pPr marL="534853" algn="l" defTabSz="1069708" rtl="0" eaLnBrk="1" latinLnBrk="0" hangingPunct="1">
-      <a:defRPr sz="2100" kern="1200">
+    <a:lvl2pPr marL="606812" algn="l" defTabSz="1213628" rtl="0" eaLnBrk="1" latinLnBrk="0" hangingPunct="1">
+      <a:defRPr sz="2400" kern="1200">
         <a:solidFill>
           <a:schemeClr val="tx1"/>
         </a:solidFill>
@@ -33,8 +33,8 @@
         <a:cs typeface="+mn-cs"/>
       </a:defRPr>
     </a:lvl2pPr>
-    <a:lvl3pPr marL="1069708" algn="l" defTabSz="1069708" rtl="0" eaLnBrk="1" latinLnBrk="0" hangingPunct="1">
-      <a:defRPr sz="2100" kern="1200">
+    <a:lvl3pPr marL="1213628" algn="l" defTabSz="1213628" rtl="0" eaLnBrk="1" latinLnBrk="0" hangingPunct="1">
+      <a:defRPr sz="2400" kern="1200">
         <a:solidFill>
           <a:schemeClr val="tx1"/>
         </a:solidFill>
@@ -43,8 +43,8 @@
         <a:cs typeface="+mn-cs"/>
       </a:defRPr>
     </a:lvl3pPr>
-    <a:lvl4pPr marL="1604561" algn="l" defTabSz="1069708" rtl="0" eaLnBrk="1" latinLnBrk="0" hangingPunct="1">
-      <a:defRPr sz="2100" kern="1200">
+    <a:lvl4pPr marL="1820440" algn="l" defTabSz="1213628" rtl="0" eaLnBrk="1" latinLnBrk="0" hangingPunct="1">
+      <a:defRPr sz="2400" kern="1200">
         <a:solidFill>
           <a:schemeClr val="tx1"/>
         </a:solidFill>
@@ -53,8 +53,8 @@
         <a:cs typeface="+mn-cs"/>
       </a:defRPr>
     </a:lvl4pPr>
-    <a:lvl5pPr marL="2139414" algn="l" defTabSz="1069708" rtl="0" eaLnBrk="1" latinLnBrk="0" hangingPunct="1">
-      <a:defRPr sz="2100" kern="1200">
+    <a:lvl5pPr marL="2427254" algn="l" defTabSz="1213628" rtl="0" eaLnBrk="1" latinLnBrk="0" hangingPunct="1">
+      <a:defRPr sz="2400" kern="1200">
         <a:solidFill>
           <a:schemeClr val="tx1"/>
         </a:solidFill>
@@ -63,8 +63,8 @@
         <a:cs typeface="+mn-cs"/>
       </a:defRPr>
     </a:lvl5pPr>
-    <a:lvl6pPr marL="2674267" algn="l" defTabSz="1069708" rtl="0" eaLnBrk="1" latinLnBrk="0" hangingPunct="1">
-      <a:defRPr sz="2100" kern="1200">
+    <a:lvl6pPr marL="3034066" algn="l" defTabSz="1213628" rtl="0" eaLnBrk="1" latinLnBrk="0" hangingPunct="1">
+      <a:defRPr sz="2400" kern="1200">
         <a:solidFill>
           <a:schemeClr val="tx1"/>
         </a:solidFill>
@@ -73,8 +73,8 @@
         <a:cs typeface="+mn-cs"/>
       </a:defRPr>
     </a:lvl6pPr>
-    <a:lvl7pPr marL="3209120" algn="l" defTabSz="1069708" rtl="0" eaLnBrk="1" latinLnBrk="0" hangingPunct="1">
-      <a:defRPr sz="2100" kern="1200">
+    <a:lvl7pPr marL="3640879" algn="l" defTabSz="1213628" rtl="0" eaLnBrk="1" latinLnBrk="0" hangingPunct="1">
+      <a:defRPr sz="2400" kern="1200">
         <a:solidFill>
           <a:schemeClr val="tx1"/>
         </a:solidFill>
@@ -83,8 +83,8 @@
         <a:cs typeface="+mn-cs"/>
       </a:defRPr>
     </a:lvl7pPr>
-    <a:lvl8pPr marL="3743974" algn="l" defTabSz="1069708" rtl="0" eaLnBrk="1" latinLnBrk="0" hangingPunct="1">
-      <a:defRPr sz="2100" kern="1200">
+    <a:lvl8pPr marL="4247693" algn="l" defTabSz="1213628" rtl="0" eaLnBrk="1" latinLnBrk="0" hangingPunct="1">
+      <a:defRPr sz="2400" kern="1200">
         <a:solidFill>
           <a:schemeClr val="tx1"/>
         </a:solidFill>
@@ -93,8 +93,8 @@
         <a:cs typeface="+mn-cs"/>
       </a:defRPr>
     </a:lvl8pPr>
-    <a:lvl9pPr marL="4278828" algn="l" defTabSz="1069708" rtl="0" eaLnBrk="1" latinLnBrk="0" hangingPunct="1">
-      <a:defRPr sz="2100" kern="1200">
+    <a:lvl9pPr marL="4854507" algn="l" defTabSz="1213628" rtl="0" eaLnBrk="1" latinLnBrk="0" hangingPunct="1">
+      <a:defRPr sz="2400" kern="1200">
         <a:solidFill>
           <a:schemeClr val="tx1"/>
         </a:solidFill>
@@ -1371,59 +1371,59 @@
     </dgm:pt>
   </dgm:ptLst>
   <dgm:cxnLst>
-    <dgm:cxn modelId="{78AAD22B-07AF-48C1-9D1B-6B6E5E512C56}" type="presOf" srcId="{F7EA5F88-4032-45E8-8B34-813B51991F21}" destId="{E31A2CBF-BE57-4423-A854-70439E960167}" srcOrd="0" destOrd="0" presId="urn:microsoft.com/office/officeart/2009/layout/CirclePictureHierarchy"/>
-    <dgm:cxn modelId="{0F11F346-646B-4933-8EE1-B45987A73065}" type="presOf" srcId="{66CBF73F-C158-426A-8B6D-97C80EAB22C3}" destId="{C029D2E7-D7B4-431A-9E73-DDDED138DB28}" srcOrd="0" destOrd="0" presId="urn:microsoft.com/office/officeart/2009/layout/CirclePictureHierarchy"/>
+    <dgm:cxn modelId="{A2153198-EEE4-4105-940C-ACF3F2B15E86}" type="presOf" srcId="{8A758F81-EA75-4BCA-BB85-E3FD0C2C69B0}" destId="{CD764150-6C75-4362-A179-BECA07CA5E06}" srcOrd="0" destOrd="0" presId="urn:microsoft.com/office/officeart/2009/layout/CirclePictureHierarchy"/>
     <dgm:cxn modelId="{1918E30F-43BB-42B4-986F-846DF82FB651}" srcId="{4DECFC59-2630-4238-95E8-AAB56C1AA279}" destId="{8A758F81-EA75-4BCA-BB85-E3FD0C2C69B0}" srcOrd="0" destOrd="0" parTransId="{F879BE02-0700-4BE0-B808-3DA295FFEFFA}" sibTransId="{15C0AEAD-5CCD-4710-9D7C-E0569B5EDDA9}"/>
     <dgm:cxn modelId="{029E3CB1-3877-451C-B75D-F92DF3ABE8C1}" srcId="{8A758F81-EA75-4BCA-BB85-E3FD0C2C69B0}" destId="{38227501-A7D0-4940-8E19-4724BC468531}" srcOrd="1" destOrd="0" parTransId="{77BA070F-1763-4C7A-9866-C694394637DC}" sibTransId="{B8B560DC-B957-4E83-9CD4-C05E24AD65C5}"/>
-    <dgm:cxn modelId="{7DEE10EE-7A8C-4848-B253-26FE39FEB183}" type="presOf" srcId="{4DECFC59-2630-4238-95E8-AAB56C1AA279}" destId="{C3818561-1F6C-4D90-9988-3CBB2604A3FF}" srcOrd="0" destOrd="0" presId="urn:microsoft.com/office/officeart/2009/layout/CirclePictureHierarchy"/>
-    <dgm:cxn modelId="{5E4F6CBF-E509-4E54-A7A2-9E2CD115A790}" type="presOf" srcId="{6F421349-FC5B-42A6-9234-44DEF9B87834}" destId="{CC201A89-7BD3-46E9-AFA4-7C898A170CF2}" srcOrd="0" destOrd="0" presId="urn:microsoft.com/office/officeart/2009/layout/CirclePictureHierarchy"/>
-    <dgm:cxn modelId="{A1AEDF5C-3DAF-4078-B6E9-4C48C7049A59}" type="presOf" srcId="{FE6BAD2B-2512-44C6-9C7B-0D40224D3CF5}" destId="{5C9AB421-000D-4BE7-BF98-4E4AD98795FF}" srcOrd="0" destOrd="0" presId="urn:microsoft.com/office/officeart/2009/layout/CirclePictureHierarchy"/>
-    <dgm:cxn modelId="{E2E9EC3C-30AE-463C-A268-2227B53D53DF}" type="presOf" srcId="{77BA070F-1763-4C7A-9866-C694394637DC}" destId="{DDEF800D-0BE6-4A64-8B8E-DDB05C547DD6}" srcOrd="0" destOrd="0" presId="urn:microsoft.com/office/officeart/2009/layout/CirclePictureHierarchy"/>
-    <dgm:cxn modelId="{D944C3DF-51BD-40C4-AC14-2C62DB4425BC}" type="presOf" srcId="{04D0F4D4-425A-40E1-997B-723714E81623}" destId="{5689DFC0-63AE-4E01-BF1E-63C0801F86E7}" srcOrd="0" destOrd="0" presId="urn:microsoft.com/office/officeart/2009/layout/CirclePictureHierarchy"/>
-    <dgm:cxn modelId="{DA07008F-9AD6-4123-8EC9-B737E9DDD45B}" type="presOf" srcId="{BEEEAE45-F751-4F8F-9E53-C9B90CDAE500}" destId="{C246CA49-489D-4F1A-BB38-150740799A75}" srcOrd="0" destOrd="0" presId="urn:microsoft.com/office/officeart/2009/layout/CirclePictureHierarchy"/>
+    <dgm:cxn modelId="{8DA05F78-FFD0-4ED9-8896-5CE774B6D45A}" type="presOf" srcId="{04D0F4D4-425A-40E1-997B-723714E81623}" destId="{5689DFC0-63AE-4E01-BF1E-63C0801F86E7}" srcOrd="0" destOrd="0" presId="urn:microsoft.com/office/officeart/2009/layout/CirclePictureHierarchy"/>
+    <dgm:cxn modelId="{4BD2C2FB-0D04-4520-9089-CACF4233582E}" type="presOf" srcId="{4DECFC59-2630-4238-95E8-AAB56C1AA279}" destId="{C3818561-1F6C-4D90-9988-3CBB2604A3FF}" srcOrd="0" destOrd="0" presId="urn:microsoft.com/office/officeart/2009/layout/CirclePictureHierarchy"/>
+    <dgm:cxn modelId="{FB79AE2F-AAFC-40A9-8EF5-F92C7C735BE1}" type="presOf" srcId="{7CE140EC-5D08-4269-A9C4-E7179C4FD42D}" destId="{8F8554AD-1DC1-4CEE-8D26-40309C347C54}" srcOrd="0" destOrd="0" presId="urn:microsoft.com/office/officeart/2009/layout/CirclePictureHierarchy"/>
+    <dgm:cxn modelId="{48ABD36E-E1D4-45A6-9394-E5E33EDFDFFC}" type="presOf" srcId="{BEEEAE45-F751-4F8F-9E53-C9B90CDAE500}" destId="{C246CA49-489D-4F1A-BB38-150740799A75}" srcOrd="0" destOrd="0" presId="urn:microsoft.com/office/officeart/2009/layout/CirclePictureHierarchy"/>
     <dgm:cxn modelId="{9853DA35-0F51-4325-9F54-851F62A680C7}" srcId="{4DECFC59-2630-4238-95E8-AAB56C1AA279}" destId="{F7EA5F88-4032-45E8-8B34-813B51991F21}" srcOrd="1" destOrd="0" parTransId="{BEEEAE45-F751-4F8F-9E53-C9B90CDAE500}" sibTransId="{0AF004BC-2E5E-45B7-964C-CFCE1F4A6CA3}"/>
+    <dgm:cxn modelId="{E2AAAA7C-02D3-44A3-B68E-48AF02C41ED6}" type="presOf" srcId="{F879BE02-0700-4BE0-B808-3DA295FFEFFA}" destId="{6251DA30-E766-4265-BA09-2E9AFBBBB1CA}" srcOrd="0" destOrd="0" presId="urn:microsoft.com/office/officeart/2009/layout/CirclePictureHierarchy"/>
+    <dgm:cxn modelId="{12CD24A8-BD82-412E-B277-F06DA3CB6633}" type="presOf" srcId="{77BA070F-1763-4C7A-9866-C694394637DC}" destId="{DDEF800D-0BE6-4A64-8B8E-DDB05C547DD6}" srcOrd="0" destOrd="0" presId="urn:microsoft.com/office/officeart/2009/layout/CirclePictureHierarchy"/>
+    <dgm:cxn modelId="{9BA4D782-C385-4A9A-8DCA-257787C07258}" type="presOf" srcId="{38227501-A7D0-4940-8E19-4724BC468531}" destId="{2C3C9624-63B9-487C-BD3B-88D8B6392DAB}" srcOrd="0" destOrd="0" presId="urn:microsoft.com/office/officeart/2009/layout/CirclePictureHierarchy"/>
     <dgm:cxn modelId="{F5FC5F14-AF0B-46DB-AC2C-71AF0AD7EDC5}" srcId="{8A758F81-EA75-4BCA-BB85-E3FD0C2C69B0}" destId="{04D0F4D4-425A-40E1-997B-723714E81623}" srcOrd="0" destOrd="0" parTransId="{66CBF73F-C158-426A-8B6D-97C80EAB22C3}" sibTransId="{E48EE423-A0F2-47AF-AFDA-43BA7EDC587F}"/>
     <dgm:cxn modelId="{A15316E8-29FD-46E5-B809-61AE87B56198}" srcId="{F7EA5F88-4032-45E8-8B34-813B51991F21}" destId="{7CE140EC-5D08-4269-A9C4-E7179C4FD42D}" srcOrd="0" destOrd="0" parTransId="{6F421349-FC5B-42A6-9234-44DEF9B87834}" sibTransId="{845D7C1A-FCC4-433F-9B36-72009FD3A00D}"/>
-    <dgm:cxn modelId="{D00A4C5F-F332-41E6-8068-63A0224BEC31}" type="presOf" srcId="{8A758F81-EA75-4BCA-BB85-E3FD0C2C69B0}" destId="{CD764150-6C75-4362-A179-BECA07CA5E06}" srcOrd="0" destOrd="0" presId="urn:microsoft.com/office/officeart/2009/layout/CirclePictureHierarchy"/>
+    <dgm:cxn modelId="{864BC391-E2A3-4683-B956-395493D5E152}" type="presOf" srcId="{6F421349-FC5B-42A6-9234-44DEF9B87834}" destId="{CC201A89-7BD3-46E9-AFA4-7C898A170CF2}" srcOrd="0" destOrd="0" presId="urn:microsoft.com/office/officeart/2009/layout/CirclePictureHierarchy"/>
     <dgm:cxn modelId="{56DE1022-A6C2-4BAC-BD34-7608BA09D2C4}" srcId="{FE6BAD2B-2512-44C6-9C7B-0D40224D3CF5}" destId="{4DECFC59-2630-4238-95E8-AAB56C1AA279}" srcOrd="0" destOrd="0" parTransId="{F805886C-C1A3-41DA-A289-69DF4C458E0B}" sibTransId="{0D4D9A5B-4CFC-499E-A3DF-652FE48208E0}"/>
-    <dgm:cxn modelId="{47CA4834-E474-4A82-BC29-A83ADCBBCAC5}" type="presOf" srcId="{38227501-A7D0-4940-8E19-4724BC468531}" destId="{2C3C9624-63B9-487C-BD3B-88D8B6392DAB}" srcOrd="0" destOrd="0" presId="urn:microsoft.com/office/officeart/2009/layout/CirclePictureHierarchy"/>
-    <dgm:cxn modelId="{6DFF7A11-962E-4996-B363-402F58073B6F}" type="presOf" srcId="{F879BE02-0700-4BE0-B808-3DA295FFEFFA}" destId="{6251DA30-E766-4265-BA09-2E9AFBBBB1CA}" srcOrd="0" destOrd="0" presId="urn:microsoft.com/office/officeart/2009/layout/CirclePictureHierarchy"/>
-    <dgm:cxn modelId="{5DFBF781-9909-4EEC-AFF6-58B5883546FA}" type="presOf" srcId="{7CE140EC-5D08-4269-A9C4-E7179C4FD42D}" destId="{8F8554AD-1DC1-4CEE-8D26-40309C347C54}" srcOrd="0" destOrd="0" presId="urn:microsoft.com/office/officeart/2009/layout/CirclePictureHierarchy"/>
-    <dgm:cxn modelId="{3E458563-AD4A-41F4-8604-4F576CF93664}" type="presParOf" srcId="{5C9AB421-000D-4BE7-BF98-4E4AD98795FF}" destId="{BA6804CC-FBEE-41C3-821C-27B45E687562}" srcOrd="0" destOrd="0" presId="urn:microsoft.com/office/officeart/2009/layout/CirclePictureHierarchy"/>
-    <dgm:cxn modelId="{E919CDEF-5345-4EC9-97B9-3BB820FFCE82}" type="presParOf" srcId="{BA6804CC-FBEE-41C3-821C-27B45E687562}" destId="{B2023872-752D-4BE0-8309-BECBEE944DEA}" srcOrd="0" destOrd="0" presId="urn:microsoft.com/office/officeart/2009/layout/CirclePictureHierarchy"/>
-    <dgm:cxn modelId="{8CF0CB23-4EAE-4FE6-9ABA-A7987DD07808}" type="presParOf" srcId="{B2023872-752D-4BE0-8309-BECBEE944DEA}" destId="{4C6E2CFA-CFD6-4670-92A6-0CD08E8F91E7}" srcOrd="0" destOrd="0" presId="urn:microsoft.com/office/officeart/2009/layout/CirclePictureHierarchy"/>
-    <dgm:cxn modelId="{26194F7E-756F-46AC-A8BE-76775D4E5602}" type="presParOf" srcId="{B2023872-752D-4BE0-8309-BECBEE944DEA}" destId="{C3818561-1F6C-4D90-9988-3CBB2604A3FF}" srcOrd="1" destOrd="0" presId="urn:microsoft.com/office/officeart/2009/layout/CirclePictureHierarchy"/>
-    <dgm:cxn modelId="{03DD7179-C973-47D6-98E6-5A01DE6E3638}" type="presParOf" srcId="{BA6804CC-FBEE-41C3-821C-27B45E687562}" destId="{762BB7CF-2111-4433-B02B-1CE22B497694}" srcOrd="1" destOrd="0" presId="urn:microsoft.com/office/officeart/2009/layout/CirclePictureHierarchy"/>
-    <dgm:cxn modelId="{9227B03D-F461-4432-8C16-71E77719B61C}" type="presParOf" srcId="{762BB7CF-2111-4433-B02B-1CE22B497694}" destId="{6251DA30-E766-4265-BA09-2E9AFBBBB1CA}" srcOrd="0" destOrd="0" presId="urn:microsoft.com/office/officeart/2009/layout/CirclePictureHierarchy"/>
-    <dgm:cxn modelId="{7FAA4D2C-4A0B-459F-B622-AC353866C20A}" type="presParOf" srcId="{762BB7CF-2111-4433-B02B-1CE22B497694}" destId="{19EDDE90-019C-4F1C-8D82-763D2DB8B83F}" srcOrd="1" destOrd="0" presId="urn:microsoft.com/office/officeart/2009/layout/CirclePictureHierarchy"/>
-    <dgm:cxn modelId="{2A75D266-C25B-437B-A4D2-17ECF1FFE3CA}" type="presParOf" srcId="{19EDDE90-019C-4F1C-8D82-763D2DB8B83F}" destId="{D303263C-E8A2-4A96-ACD9-5E350C1DBDDA}" srcOrd="0" destOrd="0" presId="urn:microsoft.com/office/officeart/2009/layout/CirclePictureHierarchy"/>
-    <dgm:cxn modelId="{820E59F8-1BF2-4B19-A364-7EB93E27E343}" type="presParOf" srcId="{D303263C-E8A2-4A96-ACD9-5E350C1DBDDA}" destId="{837436D3-BF38-4435-9B2C-451105AA62C1}" srcOrd="0" destOrd="0" presId="urn:microsoft.com/office/officeart/2009/layout/CirclePictureHierarchy"/>
-    <dgm:cxn modelId="{92A7B126-94A3-4A13-9D89-30C75C56B2A7}" type="presParOf" srcId="{D303263C-E8A2-4A96-ACD9-5E350C1DBDDA}" destId="{CD764150-6C75-4362-A179-BECA07CA5E06}" srcOrd="1" destOrd="0" presId="urn:microsoft.com/office/officeart/2009/layout/CirclePictureHierarchy"/>
-    <dgm:cxn modelId="{E6C8BBCA-0A47-44B6-9BFA-39BFDF07105D}" type="presParOf" srcId="{19EDDE90-019C-4F1C-8D82-763D2DB8B83F}" destId="{B9667F46-07B7-442A-B9C7-A3FC39C530AB}" srcOrd="1" destOrd="0" presId="urn:microsoft.com/office/officeart/2009/layout/CirclePictureHierarchy"/>
-    <dgm:cxn modelId="{9A1559C6-1E6D-4885-85F3-7E1258BEBFFD}" type="presParOf" srcId="{B9667F46-07B7-442A-B9C7-A3FC39C530AB}" destId="{C029D2E7-D7B4-431A-9E73-DDDED138DB28}" srcOrd="0" destOrd="0" presId="urn:microsoft.com/office/officeart/2009/layout/CirclePictureHierarchy"/>
-    <dgm:cxn modelId="{6DD24F33-1EE9-4EA1-8E28-B1C08434CE09}" type="presParOf" srcId="{B9667F46-07B7-442A-B9C7-A3FC39C530AB}" destId="{09D02172-1EF9-45CD-A4BA-D1F753A8D106}" srcOrd="1" destOrd="0" presId="urn:microsoft.com/office/officeart/2009/layout/CirclePictureHierarchy"/>
-    <dgm:cxn modelId="{E3567B03-E731-4934-8907-0B3C8B7819AC}" type="presParOf" srcId="{09D02172-1EF9-45CD-A4BA-D1F753A8D106}" destId="{BA0B6D48-9543-4F85-8176-24ED5ED8BF88}" srcOrd="0" destOrd="0" presId="urn:microsoft.com/office/officeart/2009/layout/CirclePictureHierarchy"/>
-    <dgm:cxn modelId="{7EBBFE31-A87F-4DAC-B086-09A4EC2CB7A7}" type="presParOf" srcId="{BA0B6D48-9543-4F85-8176-24ED5ED8BF88}" destId="{78D97D0B-F802-4494-B0CD-F9D696FF832E}" srcOrd="0" destOrd="0" presId="urn:microsoft.com/office/officeart/2009/layout/CirclePictureHierarchy"/>
-    <dgm:cxn modelId="{B578F3DC-8457-45A8-A0A0-DC34509B2EF4}" type="presParOf" srcId="{BA0B6D48-9543-4F85-8176-24ED5ED8BF88}" destId="{5689DFC0-63AE-4E01-BF1E-63C0801F86E7}" srcOrd="1" destOrd="0" presId="urn:microsoft.com/office/officeart/2009/layout/CirclePictureHierarchy"/>
-    <dgm:cxn modelId="{6A3DE04B-36CA-4ACC-83DD-2BA17024705E}" type="presParOf" srcId="{09D02172-1EF9-45CD-A4BA-D1F753A8D106}" destId="{10D18738-2CC0-4CA4-B721-7C501362E9DE}" srcOrd="1" destOrd="0" presId="urn:microsoft.com/office/officeart/2009/layout/CirclePictureHierarchy"/>
-    <dgm:cxn modelId="{89D82FEE-1BF3-4103-9C95-7653E0696069}" type="presParOf" srcId="{B9667F46-07B7-442A-B9C7-A3FC39C530AB}" destId="{DDEF800D-0BE6-4A64-8B8E-DDB05C547DD6}" srcOrd="2" destOrd="0" presId="urn:microsoft.com/office/officeart/2009/layout/CirclePictureHierarchy"/>
-    <dgm:cxn modelId="{F10D2EF7-04A0-4BF0-A025-96FD777ABD88}" type="presParOf" srcId="{B9667F46-07B7-442A-B9C7-A3FC39C530AB}" destId="{55C4E11C-D92B-48CF-9389-9F3FA0765408}" srcOrd="3" destOrd="0" presId="urn:microsoft.com/office/officeart/2009/layout/CirclePictureHierarchy"/>
-    <dgm:cxn modelId="{FFD02DA4-8FF6-4357-B104-BDAEC89788EC}" type="presParOf" srcId="{55C4E11C-D92B-48CF-9389-9F3FA0765408}" destId="{9590F2A0-BE99-4CF5-83A1-1622AB59F911}" srcOrd="0" destOrd="0" presId="urn:microsoft.com/office/officeart/2009/layout/CirclePictureHierarchy"/>
-    <dgm:cxn modelId="{334BD95C-078C-4FCC-86A6-D948CCCA1B97}" type="presParOf" srcId="{9590F2A0-BE99-4CF5-83A1-1622AB59F911}" destId="{28B02BCB-7179-44D1-89E4-AE758B9BB769}" srcOrd="0" destOrd="0" presId="urn:microsoft.com/office/officeart/2009/layout/CirclePictureHierarchy"/>
-    <dgm:cxn modelId="{D24810BC-FE55-46E8-B882-DEEEC418EE56}" type="presParOf" srcId="{9590F2A0-BE99-4CF5-83A1-1622AB59F911}" destId="{2C3C9624-63B9-487C-BD3B-88D8B6392DAB}" srcOrd="1" destOrd="0" presId="urn:microsoft.com/office/officeart/2009/layout/CirclePictureHierarchy"/>
-    <dgm:cxn modelId="{ED2D2B99-A923-4B56-AEE5-D61F1F345D3B}" type="presParOf" srcId="{55C4E11C-D92B-48CF-9389-9F3FA0765408}" destId="{FF019F2C-089D-4976-BCE0-6415A7CC357B}" srcOrd="1" destOrd="0" presId="urn:microsoft.com/office/officeart/2009/layout/CirclePictureHierarchy"/>
-    <dgm:cxn modelId="{DDA7D5C7-D50F-43BE-85B2-FBCB2B8A2465}" type="presParOf" srcId="{762BB7CF-2111-4433-B02B-1CE22B497694}" destId="{C246CA49-489D-4F1A-BB38-150740799A75}" srcOrd="2" destOrd="0" presId="urn:microsoft.com/office/officeart/2009/layout/CirclePictureHierarchy"/>
-    <dgm:cxn modelId="{EAC1A63A-AA4C-41BB-B58F-8E5EE9DA39C8}" type="presParOf" srcId="{762BB7CF-2111-4433-B02B-1CE22B497694}" destId="{ADD839FF-3E2D-476A-B923-5612EA7B0807}" srcOrd="3" destOrd="0" presId="urn:microsoft.com/office/officeart/2009/layout/CirclePictureHierarchy"/>
-    <dgm:cxn modelId="{7CD7CAA2-39A7-427E-BE1D-5A72C24AB48D}" type="presParOf" srcId="{ADD839FF-3E2D-476A-B923-5612EA7B0807}" destId="{9B496DB2-BBD4-43FD-B000-B9D582D66483}" srcOrd="0" destOrd="0" presId="urn:microsoft.com/office/officeart/2009/layout/CirclePictureHierarchy"/>
-    <dgm:cxn modelId="{67C49325-A381-4898-BAB0-83CC306C1A1D}" type="presParOf" srcId="{9B496DB2-BBD4-43FD-B000-B9D582D66483}" destId="{2FA4E567-A72A-4130-98A4-221430687DF4}" srcOrd="0" destOrd="0" presId="urn:microsoft.com/office/officeart/2009/layout/CirclePictureHierarchy"/>
-    <dgm:cxn modelId="{1E1CE68D-E570-4B2C-8ED3-1F0A3499A5E2}" type="presParOf" srcId="{9B496DB2-BBD4-43FD-B000-B9D582D66483}" destId="{E31A2CBF-BE57-4423-A854-70439E960167}" srcOrd="1" destOrd="0" presId="urn:microsoft.com/office/officeart/2009/layout/CirclePictureHierarchy"/>
-    <dgm:cxn modelId="{57891DEF-70EF-4E40-9C03-8DA1AC538119}" type="presParOf" srcId="{ADD839FF-3E2D-476A-B923-5612EA7B0807}" destId="{42C7B1DB-9BAB-4088-A46D-84C23052C6CB}" srcOrd="1" destOrd="0" presId="urn:microsoft.com/office/officeart/2009/layout/CirclePictureHierarchy"/>
-    <dgm:cxn modelId="{94149B04-FE07-452C-93F8-464C0D8C6BE3}" type="presParOf" srcId="{42C7B1DB-9BAB-4088-A46D-84C23052C6CB}" destId="{CC201A89-7BD3-46E9-AFA4-7C898A170CF2}" srcOrd="0" destOrd="0" presId="urn:microsoft.com/office/officeart/2009/layout/CirclePictureHierarchy"/>
-    <dgm:cxn modelId="{53C7B61E-6222-4C7D-BA6E-0F19108A8B91}" type="presParOf" srcId="{42C7B1DB-9BAB-4088-A46D-84C23052C6CB}" destId="{6E7366F5-3EEE-49CE-99AA-27659C2A39A8}" srcOrd="1" destOrd="0" presId="urn:microsoft.com/office/officeart/2009/layout/CirclePictureHierarchy"/>
-    <dgm:cxn modelId="{F54F72FD-F6B1-45A9-8FEF-A9B4312B2D3B}" type="presParOf" srcId="{6E7366F5-3EEE-49CE-99AA-27659C2A39A8}" destId="{75FBF97E-47B1-4FDA-8839-DEC22A426009}" srcOrd="0" destOrd="0" presId="urn:microsoft.com/office/officeart/2009/layout/CirclePictureHierarchy"/>
-    <dgm:cxn modelId="{0CFDE9F3-1981-42AF-A1EE-33AADD425EB9}" type="presParOf" srcId="{75FBF97E-47B1-4FDA-8839-DEC22A426009}" destId="{A93BFC97-6304-4276-9006-C36C570AE6E7}" srcOrd="0" destOrd="0" presId="urn:microsoft.com/office/officeart/2009/layout/CirclePictureHierarchy"/>
-    <dgm:cxn modelId="{07CA0370-FEEA-401F-A3E1-C2D6701245C0}" type="presParOf" srcId="{75FBF97E-47B1-4FDA-8839-DEC22A426009}" destId="{8F8554AD-1DC1-4CEE-8D26-40309C347C54}" srcOrd="1" destOrd="0" presId="urn:microsoft.com/office/officeart/2009/layout/CirclePictureHierarchy"/>
-    <dgm:cxn modelId="{F2FF7C3F-64B7-458B-9ECC-071A45F9B0E3}" type="presParOf" srcId="{6E7366F5-3EEE-49CE-99AA-27659C2A39A8}" destId="{70039804-C190-494B-9308-EE04F66B862D}" srcOrd="1" destOrd="0" presId="urn:microsoft.com/office/officeart/2009/layout/CirclePictureHierarchy"/>
+    <dgm:cxn modelId="{C6B4C9C6-F76D-4EE8-86D6-05774B001552}" type="presOf" srcId="{66CBF73F-C158-426A-8B6D-97C80EAB22C3}" destId="{C029D2E7-D7B4-431A-9E73-DDDED138DB28}" srcOrd="0" destOrd="0" presId="urn:microsoft.com/office/officeart/2009/layout/CirclePictureHierarchy"/>
+    <dgm:cxn modelId="{154FACE5-8CB4-445E-86BA-BA67C1C20481}" type="presOf" srcId="{FE6BAD2B-2512-44C6-9C7B-0D40224D3CF5}" destId="{5C9AB421-000D-4BE7-BF98-4E4AD98795FF}" srcOrd="0" destOrd="0" presId="urn:microsoft.com/office/officeart/2009/layout/CirclePictureHierarchy"/>
+    <dgm:cxn modelId="{E39E9458-29B5-4F56-9C38-7AA56FC8BCB7}" type="presOf" srcId="{F7EA5F88-4032-45E8-8B34-813B51991F21}" destId="{E31A2CBF-BE57-4423-A854-70439E960167}" srcOrd="0" destOrd="0" presId="urn:microsoft.com/office/officeart/2009/layout/CirclePictureHierarchy"/>
+    <dgm:cxn modelId="{F306F2D8-B762-49C5-B8BA-999AE50FAEEE}" type="presParOf" srcId="{5C9AB421-000D-4BE7-BF98-4E4AD98795FF}" destId="{BA6804CC-FBEE-41C3-821C-27B45E687562}" srcOrd="0" destOrd="0" presId="urn:microsoft.com/office/officeart/2009/layout/CirclePictureHierarchy"/>
+    <dgm:cxn modelId="{9ED52312-A802-403E-B281-AF683E25051E}" type="presParOf" srcId="{BA6804CC-FBEE-41C3-821C-27B45E687562}" destId="{B2023872-752D-4BE0-8309-BECBEE944DEA}" srcOrd="0" destOrd="0" presId="urn:microsoft.com/office/officeart/2009/layout/CirclePictureHierarchy"/>
+    <dgm:cxn modelId="{7B8144E8-51CD-439D-ACE0-9F4ED97CEE40}" type="presParOf" srcId="{B2023872-752D-4BE0-8309-BECBEE944DEA}" destId="{4C6E2CFA-CFD6-4670-92A6-0CD08E8F91E7}" srcOrd="0" destOrd="0" presId="urn:microsoft.com/office/officeart/2009/layout/CirclePictureHierarchy"/>
+    <dgm:cxn modelId="{6BF788ED-254B-4044-A4FE-20DBF87C8203}" type="presParOf" srcId="{B2023872-752D-4BE0-8309-BECBEE944DEA}" destId="{C3818561-1F6C-4D90-9988-3CBB2604A3FF}" srcOrd="1" destOrd="0" presId="urn:microsoft.com/office/officeart/2009/layout/CirclePictureHierarchy"/>
+    <dgm:cxn modelId="{9A0B0F65-C2EA-4D1D-965B-13C8CF71B23F}" type="presParOf" srcId="{BA6804CC-FBEE-41C3-821C-27B45E687562}" destId="{762BB7CF-2111-4433-B02B-1CE22B497694}" srcOrd="1" destOrd="0" presId="urn:microsoft.com/office/officeart/2009/layout/CirclePictureHierarchy"/>
+    <dgm:cxn modelId="{426E723E-713B-4044-867E-EBC729365D91}" type="presParOf" srcId="{762BB7CF-2111-4433-B02B-1CE22B497694}" destId="{6251DA30-E766-4265-BA09-2E9AFBBBB1CA}" srcOrd="0" destOrd="0" presId="urn:microsoft.com/office/officeart/2009/layout/CirclePictureHierarchy"/>
+    <dgm:cxn modelId="{D1CB0E08-1987-4B12-B177-E68F4A2F47DF}" type="presParOf" srcId="{762BB7CF-2111-4433-B02B-1CE22B497694}" destId="{19EDDE90-019C-4F1C-8D82-763D2DB8B83F}" srcOrd="1" destOrd="0" presId="urn:microsoft.com/office/officeart/2009/layout/CirclePictureHierarchy"/>
+    <dgm:cxn modelId="{D8C40F35-802D-49B8-8137-44BE1B783CDC}" type="presParOf" srcId="{19EDDE90-019C-4F1C-8D82-763D2DB8B83F}" destId="{D303263C-E8A2-4A96-ACD9-5E350C1DBDDA}" srcOrd="0" destOrd="0" presId="urn:microsoft.com/office/officeart/2009/layout/CirclePictureHierarchy"/>
+    <dgm:cxn modelId="{50F91C49-810E-42AC-B2BD-DD9374383868}" type="presParOf" srcId="{D303263C-E8A2-4A96-ACD9-5E350C1DBDDA}" destId="{837436D3-BF38-4435-9B2C-451105AA62C1}" srcOrd="0" destOrd="0" presId="urn:microsoft.com/office/officeart/2009/layout/CirclePictureHierarchy"/>
+    <dgm:cxn modelId="{370982FD-751C-4453-8F98-CCDC08F8DEB5}" type="presParOf" srcId="{D303263C-E8A2-4A96-ACD9-5E350C1DBDDA}" destId="{CD764150-6C75-4362-A179-BECA07CA5E06}" srcOrd="1" destOrd="0" presId="urn:microsoft.com/office/officeart/2009/layout/CirclePictureHierarchy"/>
+    <dgm:cxn modelId="{61C07349-144B-4B9E-8D2A-F55F25FACB19}" type="presParOf" srcId="{19EDDE90-019C-4F1C-8D82-763D2DB8B83F}" destId="{B9667F46-07B7-442A-B9C7-A3FC39C530AB}" srcOrd="1" destOrd="0" presId="urn:microsoft.com/office/officeart/2009/layout/CirclePictureHierarchy"/>
+    <dgm:cxn modelId="{27464921-E0A9-432C-923E-8ED4CFF0285F}" type="presParOf" srcId="{B9667F46-07B7-442A-B9C7-A3FC39C530AB}" destId="{C029D2E7-D7B4-431A-9E73-DDDED138DB28}" srcOrd="0" destOrd="0" presId="urn:microsoft.com/office/officeart/2009/layout/CirclePictureHierarchy"/>
+    <dgm:cxn modelId="{59870AAC-D9D0-46CA-8B88-EBDE3C79876B}" type="presParOf" srcId="{B9667F46-07B7-442A-B9C7-A3FC39C530AB}" destId="{09D02172-1EF9-45CD-A4BA-D1F753A8D106}" srcOrd="1" destOrd="0" presId="urn:microsoft.com/office/officeart/2009/layout/CirclePictureHierarchy"/>
+    <dgm:cxn modelId="{D60F2FA3-12AD-40F2-A56A-3CF50FF578E8}" type="presParOf" srcId="{09D02172-1EF9-45CD-A4BA-D1F753A8D106}" destId="{BA0B6D48-9543-4F85-8176-24ED5ED8BF88}" srcOrd="0" destOrd="0" presId="urn:microsoft.com/office/officeart/2009/layout/CirclePictureHierarchy"/>
+    <dgm:cxn modelId="{2A6174A2-4E54-452D-8595-A704F85146AB}" type="presParOf" srcId="{BA0B6D48-9543-4F85-8176-24ED5ED8BF88}" destId="{78D97D0B-F802-4494-B0CD-F9D696FF832E}" srcOrd="0" destOrd="0" presId="urn:microsoft.com/office/officeart/2009/layout/CirclePictureHierarchy"/>
+    <dgm:cxn modelId="{1EDCAF47-EA23-4A3A-AD20-FCC19267D327}" type="presParOf" srcId="{BA0B6D48-9543-4F85-8176-24ED5ED8BF88}" destId="{5689DFC0-63AE-4E01-BF1E-63C0801F86E7}" srcOrd="1" destOrd="0" presId="urn:microsoft.com/office/officeart/2009/layout/CirclePictureHierarchy"/>
+    <dgm:cxn modelId="{898AD8CF-9DC3-48B5-8AB7-01DDCDB9EF83}" type="presParOf" srcId="{09D02172-1EF9-45CD-A4BA-D1F753A8D106}" destId="{10D18738-2CC0-4CA4-B721-7C501362E9DE}" srcOrd="1" destOrd="0" presId="urn:microsoft.com/office/officeart/2009/layout/CirclePictureHierarchy"/>
+    <dgm:cxn modelId="{5FE3C317-25ED-4BC7-BCFD-83E02E8AC9CC}" type="presParOf" srcId="{B9667F46-07B7-442A-B9C7-A3FC39C530AB}" destId="{DDEF800D-0BE6-4A64-8B8E-DDB05C547DD6}" srcOrd="2" destOrd="0" presId="urn:microsoft.com/office/officeart/2009/layout/CirclePictureHierarchy"/>
+    <dgm:cxn modelId="{583CB767-84AC-4A22-9FB8-426F7E2855F0}" type="presParOf" srcId="{B9667F46-07B7-442A-B9C7-A3FC39C530AB}" destId="{55C4E11C-D92B-48CF-9389-9F3FA0765408}" srcOrd="3" destOrd="0" presId="urn:microsoft.com/office/officeart/2009/layout/CirclePictureHierarchy"/>
+    <dgm:cxn modelId="{270AE69F-F5A0-41AA-9190-812976B96502}" type="presParOf" srcId="{55C4E11C-D92B-48CF-9389-9F3FA0765408}" destId="{9590F2A0-BE99-4CF5-83A1-1622AB59F911}" srcOrd="0" destOrd="0" presId="urn:microsoft.com/office/officeart/2009/layout/CirclePictureHierarchy"/>
+    <dgm:cxn modelId="{6EEA4EEC-2812-45EA-B0A3-143479A22636}" type="presParOf" srcId="{9590F2A0-BE99-4CF5-83A1-1622AB59F911}" destId="{28B02BCB-7179-44D1-89E4-AE758B9BB769}" srcOrd="0" destOrd="0" presId="urn:microsoft.com/office/officeart/2009/layout/CirclePictureHierarchy"/>
+    <dgm:cxn modelId="{FE8B7B9B-B024-4206-9732-62D6A68CB235}" type="presParOf" srcId="{9590F2A0-BE99-4CF5-83A1-1622AB59F911}" destId="{2C3C9624-63B9-487C-BD3B-88D8B6392DAB}" srcOrd="1" destOrd="0" presId="urn:microsoft.com/office/officeart/2009/layout/CirclePictureHierarchy"/>
+    <dgm:cxn modelId="{87184A00-421A-4A7A-A480-BCD6DAF7EF28}" type="presParOf" srcId="{55C4E11C-D92B-48CF-9389-9F3FA0765408}" destId="{FF019F2C-089D-4976-BCE0-6415A7CC357B}" srcOrd="1" destOrd="0" presId="urn:microsoft.com/office/officeart/2009/layout/CirclePictureHierarchy"/>
+    <dgm:cxn modelId="{B848C541-86FF-4730-A2CD-2535E32CFAA5}" type="presParOf" srcId="{762BB7CF-2111-4433-B02B-1CE22B497694}" destId="{C246CA49-489D-4F1A-BB38-150740799A75}" srcOrd="2" destOrd="0" presId="urn:microsoft.com/office/officeart/2009/layout/CirclePictureHierarchy"/>
+    <dgm:cxn modelId="{3FEC2C5B-035D-4F7C-A4C4-419E52CE02D4}" type="presParOf" srcId="{762BB7CF-2111-4433-B02B-1CE22B497694}" destId="{ADD839FF-3E2D-476A-B923-5612EA7B0807}" srcOrd="3" destOrd="0" presId="urn:microsoft.com/office/officeart/2009/layout/CirclePictureHierarchy"/>
+    <dgm:cxn modelId="{D5D41D6D-EBEF-41B5-A348-33BF49C41102}" type="presParOf" srcId="{ADD839FF-3E2D-476A-B923-5612EA7B0807}" destId="{9B496DB2-BBD4-43FD-B000-B9D582D66483}" srcOrd="0" destOrd="0" presId="urn:microsoft.com/office/officeart/2009/layout/CirclePictureHierarchy"/>
+    <dgm:cxn modelId="{785ED26F-25CF-4E66-8C6F-FD52F83057ED}" type="presParOf" srcId="{9B496DB2-BBD4-43FD-B000-B9D582D66483}" destId="{2FA4E567-A72A-4130-98A4-221430687DF4}" srcOrd="0" destOrd="0" presId="urn:microsoft.com/office/officeart/2009/layout/CirclePictureHierarchy"/>
+    <dgm:cxn modelId="{F983A770-E1B0-40E8-8E55-F2F7CFF2BA72}" type="presParOf" srcId="{9B496DB2-BBD4-43FD-B000-B9D582D66483}" destId="{E31A2CBF-BE57-4423-A854-70439E960167}" srcOrd="1" destOrd="0" presId="urn:microsoft.com/office/officeart/2009/layout/CirclePictureHierarchy"/>
+    <dgm:cxn modelId="{8E52772D-F70A-4E9D-99FA-5C6F0E77CC9D}" type="presParOf" srcId="{ADD839FF-3E2D-476A-B923-5612EA7B0807}" destId="{42C7B1DB-9BAB-4088-A46D-84C23052C6CB}" srcOrd="1" destOrd="0" presId="urn:microsoft.com/office/officeart/2009/layout/CirclePictureHierarchy"/>
+    <dgm:cxn modelId="{CBC43988-9F26-4430-A41A-32BD94F149E2}" type="presParOf" srcId="{42C7B1DB-9BAB-4088-A46D-84C23052C6CB}" destId="{CC201A89-7BD3-46E9-AFA4-7C898A170CF2}" srcOrd="0" destOrd="0" presId="urn:microsoft.com/office/officeart/2009/layout/CirclePictureHierarchy"/>
+    <dgm:cxn modelId="{A9ED180D-0F34-480A-91D2-EDCDDC741E5B}" type="presParOf" srcId="{42C7B1DB-9BAB-4088-A46D-84C23052C6CB}" destId="{6E7366F5-3EEE-49CE-99AA-27659C2A39A8}" srcOrd="1" destOrd="0" presId="urn:microsoft.com/office/officeart/2009/layout/CirclePictureHierarchy"/>
+    <dgm:cxn modelId="{7250BD07-7133-40BB-8447-1EC1EA9D0DF7}" type="presParOf" srcId="{6E7366F5-3EEE-49CE-99AA-27659C2A39A8}" destId="{75FBF97E-47B1-4FDA-8839-DEC22A426009}" srcOrd="0" destOrd="0" presId="urn:microsoft.com/office/officeart/2009/layout/CirclePictureHierarchy"/>
+    <dgm:cxn modelId="{AE2BA317-EE05-4FB2-848A-29BEB1415008}" type="presParOf" srcId="{75FBF97E-47B1-4FDA-8839-DEC22A426009}" destId="{A93BFC97-6304-4276-9006-C36C570AE6E7}" srcOrd="0" destOrd="0" presId="urn:microsoft.com/office/officeart/2009/layout/CirclePictureHierarchy"/>
+    <dgm:cxn modelId="{95AA659A-E8B8-498E-8301-547E8F045040}" type="presParOf" srcId="{75FBF97E-47B1-4FDA-8839-DEC22A426009}" destId="{8F8554AD-1DC1-4CEE-8D26-40309C347C54}" srcOrd="1" destOrd="0" presId="urn:microsoft.com/office/officeart/2009/layout/CirclePictureHierarchy"/>
+    <dgm:cxn modelId="{6627A11A-51DD-492F-A359-6C0B8D1ED216}" type="presParOf" srcId="{6E7366F5-3EEE-49CE-99AA-27659C2A39A8}" destId="{70039804-C190-494B-9308-EE04F66B862D}" srcOrd="1" destOrd="0" presId="urn:microsoft.com/office/officeart/2009/layout/CirclePictureHierarchy"/>
   </dgm:cxnLst>
   <dgm:bg/>
   <dgm:whole/>
@@ -4016,8 +4016,8 @@
         </p:nvSpPr>
         <p:spPr>
           <a:xfrm>
-            <a:off x="702112" y="2908134"/>
-            <a:ext cx="7957265" cy="2006652"/>
+            <a:off x="918091" y="1901606"/>
+            <a:ext cx="10405032" cy="1312133"/>
           </a:xfrm>
         </p:spPr>
         <p:txBody>
@@ -4044,8 +4044,8 @@
         </p:nvSpPr>
         <p:spPr>
           <a:xfrm>
-            <a:off x="1404223" y="5304846"/>
-            <a:ext cx="6553043" cy="2392381"/>
+            <a:off x="1836185" y="3468796"/>
+            <a:ext cx="8568851" cy="1564358"/>
           </a:xfrm>
         </p:spPr>
         <p:txBody>
@@ -4061,7 +4061,7 @@
                 </a:solidFill>
               </a:defRPr>
             </a:lvl1pPr>
-            <a:lvl2pPr marL="534853" indent="0" algn="ctr">
+            <a:lvl2pPr marL="606812" indent="0" algn="ctr">
               <a:buNone/>
               <a:defRPr>
                 <a:solidFill>
@@ -4071,7 +4071,7 @@
                 </a:solidFill>
               </a:defRPr>
             </a:lvl2pPr>
-            <a:lvl3pPr marL="1069708" indent="0" algn="ctr">
+            <a:lvl3pPr marL="1213628" indent="0" algn="ctr">
               <a:buNone/>
               <a:defRPr>
                 <a:solidFill>
@@ -4081,7 +4081,7 @@
                 </a:solidFill>
               </a:defRPr>
             </a:lvl3pPr>
-            <a:lvl4pPr marL="1604561" indent="0" algn="ctr">
+            <a:lvl4pPr marL="1820440" indent="0" algn="ctr">
               <a:buNone/>
               <a:defRPr>
                 <a:solidFill>
@@ -4091,7 +4091,7 @@
                 </a:solidFill>
               </a:defRPr>
             </a:lvl4pPr>
-            <a:lvl5pPr marL="2139414" indent="0" algn="ctr">
+            <a:lvl5pPr marL="2427254" indent="0" algn="ctr">
               <a:buNone/>
               <a:defRPr>
                 <a:solidFill>
@@ -4101,7 +4101,7 @@
                 </a:solidFill>
               </a:defRPr>
             </a:lvl5pPr>
-            <a:lvl6pPr marL="2674267" indent="0" algn="ctr">
+            <a:lvl6pPr marL="3034066" indent="0" algn="ctr">
               <a:buNone/>
               <a:defRPr>
                 <a:solidFill>
@@ -4111,7 +4111,7 @@
                 </a:solidFill>
               </a:defRPr>
             </a:lvl6pPr>
-            <a:lvl7pPr marL="3209120" indent="0" algn="ctr">
+            <a:lvl7pPr marL="3640879" indent="0" algn="ctr">
               <a:buNone/>
               <a:defRPr>
                 <a:solidFill>
@@ -4121,7 +4121,7 @@
                 </a:solidFill>
               </a:defRPr>
             </a:lvl7pPr>
-            <a:lvl8pPr marL="3743974" indent="0" algn="ctr">
+            <a:lvl8pPr marL="4247693" indent="0" algn="ctr">
               <a:buNone/>
               <a:defRPr>
                 <a:solidFill>
@@ -4131,7 +4131,7 @@
                 </a:solidFill>
               </a:defRPr>
             </a:lvl8pPr>
-            <a:lvl9pPr marL="4278828" indent="0" algn="ctr">
+            <a:lvl9pPr marL="4854507" indent="0" algn="ctr">
               <a:buNone/>
               <a:defRPr>
                 <a:solidFill>
@@ -4168,7 +4168,7 @@
           <a:p>
             <a:fld id="{72234E71-0DA4-4CEC-8777-D274EF3906C1}" type="datetimeFigureOut">
               <a:rPr lang="en-US" smtClean="0"/>
-              <a:t>28/04/2019</a:t>
+              <a:t>18/05/2019</a:t>
             </a:fld>
             <a:endParaRPr lang="en-US"/>
           </a:p>
@@ -4338,7 +4338,7 @@
           <a:p>
             <a:fld id="{72234E71-0DA4-4CEC-8777-D274EF3906C1}" type="datetimeFigureOut">
               <a:rPr lang="en-US" smtClean="0"/>
-              <a:t>28/04/2019</a:t>
+              <a:t>18/05/2019</a:t>
             </a:fld>
             <a:endParaRPr lang="en-US"/>
           </a:p>
@@ -4428,8 +4428,8 @@
         </p:nvSpPr>
         <p:spPr>
           <a:xfrm>
-            <a:off x="8017402" y="589430"/>
-            <a:ext cx="2488269" cy="12581666"/>
+            <a:off x="10483671" y="385423"/>
+            <a:ext cx="3253695" cy="8227048"/>
           </a:xfrm>
         </p:spPr>
         <p:txBody>
@@ -4456,8 +4456,8 @@
         </p:nvSpPr>
         <p:spPr>
           <a:xfrm>
-            <a:off x="552587" y="589430"/>
-            <a:ext cx="7308788" cy="12581666"/>
+            <a:off x="722571" y="385423"/>
+            <a:ext cx="9557074" cy="8227048"/>
           </a:xfrm>
         </p:spPr>
         <p:txBody>
@@ -4518,7 +4518,7 @@
           <a:p>
             <a:fld id="{72234E71-0DA4-4CEC-8777-D274EF3906C1}" type="datetimeFigureOut">
               <a:rPr lang="en-US" smtClean="0"/>
-              <a:t>28/04/2019</a:t>
+              <a:t>18/05/2019</a:t>
             </a:fld>
             <a:endParaRPr lang="en-US"/>
           </a:p>
@@ -4688,7 +4688,7 @@
           <a:p>
             <a:fld id="{72234E71-0DA4-4CEC-8777-D274EF3906C1}" type="datetimeFigureOut">
               <a:rPr lang="en-US" smtClean="0"/>
-              <a:t>28/04/2019</a:t>
+              <a:t>18/05/2019</a:t>
             </a:fld>
             <a:endParaRPr lang="en-US"/>
           </a:p>
@@ -4778,15 +4778,15 @@
         </p:nvSpPr>
         <p:spPr>
           <a:xfrm>
-            <a:off x="739494" y="6015624"/>
-            <a:ext cx="7957265" cy="1859295"/>
+            <a:off x="966973" y="3933568"/>
+            <a:ext cx="10405032" cy="1215777"/>
           </a:xfrm>
         </p:spPr>
         <p:txBody>
           <a:bodyPr anchor="t"/>
           <a:lstStyle>
             <a:lvl1pPr algn="l">
-              <a:defRPr sz="4700" b="1" cap="all"/>
+              <a:defRPr sz="5300" b="1" cap="all"/>
             </a:lvl1pPr>
           </a:lstStyle>
           <a:p>
@@ -4810,8 +4810,8 @@
         </p:nvSpPr>
         <p:spPr>
           <a:xfrm>
-            <a:off x="739494" y="3967803"/>
-            <a:ext cx="7957265" cy="2047825"/>
+            <a:off x="966973" y="2594515"/>
+            <a:ext cx="10405032" cy="1339056"/>
           </a:xfrm>
         </p:spPr>
         <p:txBody>
@@ -4819,7 +4819,7 @@
           <a:lstStyle>
             <a:lvl1pPr marL="0" indent="0">
               <a:buNone/>
-              <a:defRPr sz="2300">
+              <a:defRPr sz="2600">
                 <a:solidFill>
                   <a:schemeClr val="tx1">
                     <a:tint val="75000"/>
@@ -4827,7 +4827,17 @@
                 </a:solidFill>
               </a:defRPr>
             </a:lvl1pPr>
-            <a:lvl2pPr marL="534853" indent="0">
+            <a:lvl2pPr marL="606812" indent="0">
+              <a:buNone/>
+              <a:defRPr sz="2400">
+                <a:solidFill>
+                  <a:schemeClr val="tx1">
+                    <a:tint val="75000"/>
+                  </a:schemeClr>
+                </a:solidFill>
+              </a:defRPr>
+            </a:lvl2pPr>
+            <a:lvl3pPr marL="1213628" indent="0">
               <a:buNone/>
               <a:defRPr sz="2100">
                 <a:solidFill>
@@ -4836,20 +4846,10 @@
                   </a:schemeClr>
                 </a:solidFill>
               </a:defRPr>
-            </a:lvl2pPr>
-            <a:lvl3pPr marL="1069708" indent="0">
+            </a:lvl3pPr>
+            <a:lvl4pPr marL="1820440" indent="0">
               <a:buNone/>
-              <a:defRPr sz="1900">
-                <a:solidFill>
-                  <a:schemeClr val="tx1">
-                    <a:tint val="75000"/>
-                  </a:schemeClr>
-                </a:solidFill>
-              </a:defRPr>
-            </a:lvl3pPr>
-            <a:lvl4pPr marL="1604561" indent="0">
-              <a:buNone/>
-              <a:defRPr sz="1600">
+              <a:defRPr sz="1800">
                 <a:solidFill>
                   <a:schemeClr val="tx1">
                     <a:tint val="75000"/>
@@ -4857,9 +4857,9 @@
                 </a:solidFill>
               </a:defRPr>
             </a:lvl4pPr>
-            <a:lvl5pPr marL="2139414" indent="0">
+            <a:lvl5pPr marL="2427254" indent="0">
               <a:buNone/>
-              <a:defRPr sz="1600">
+              <a:defRPr sz="1800">
                 <a:solidFill>
                   <a:schemeClr val="tx1">
                     <a:tint val="75000"/>
@@ -4867,9 +4867,9 @@
                 </a:solidFill>
               </a:defRPr>
             </a:lvl5pPr>
-            <a:lvl6pPr marL="2674267" indent="0">
+            <a:lvl6pPr marL="3034066" indent="0">
               <a:buNone/>
-              <a:defRPr sz="1600">
+              <a:defRPr sz="1800">
                 <a:solidFill>
                   <a:schemeClr val="tx1">
                     <a:tint val="75000"/>
@@ -4877,9 +4877,9 @@
                 </a:solidFill>
               </a:defRPr>
             </a:lvl6pPr>
-            <a:lvl7pPr marL="3209120" indent="0">
+            <a:lvl7pPr marL="3640879" indent="0">
               <a:buNone/>
-              <a:defRPr sz="1600">
+              <a:defRPr sz="1800">
                 <a:solidFill>
                   <a:schemeClr val="tx1">
                     <a:tint val="75000"/>
@@ -4887,9 +4887,9 @@
                 </a:solidFill>
               </a:defRPr>
             </a:lvl7pPr>
-            <a:lvl8pPr marL="3743974" indent="0">
+            <a:lvl8pPr marL="4247693" indent="0">
               <a:buNone/>
-              <a:defRPr sz="1600">
+              <a:defRPr sz="1800">
                 <a:solidFill>
                   <a:schemeClr val="tx1">
                     <a:tint val="75000"/>
@@ -4897,9 +4897,9 @@
                 </a:solidFill>
               </a:defRPr>
             </a:lvl8pPr>
-            <a:lvl9pPr marL="4278828" indent="0">
+            <a:lvl9pPr marL="4854507" indent="0">
               <a:buNone/>
-              <a:defRPr sz="1600">
+              <a:defRPr sz="1800">
                 <a:solidFill>
                   <a:schemeClr val="tx1">
                     <a:tint val="75000"/>
@@ -4934,7 +4934,7 @@
           <a:p>
             <a:fld id="{72234E71-0DA4-4CEC-8777-D274EF3906C1}" type="datetimeFigureOut">
               <a:rPr lang="en-US" smtClean="0"/>
-              <a:t>28/04/2019</a:t>
+              <a:t>18/05/2019</a:t>
             </a:fld>
             <a:endParaRPr lang="en-US"/>
           </a:p>
@@ -5047,39 +5047,39 @@
         </p:nvSpPr>
         <p:spPr>
           <a:xfrm>
-            <a:off x="552590" y="3441217"/>
-            <a:ext cx="4898529" cy="9729880"/>
+            <a:off x="722575" y="2250184"/>
+            <a:ext cx="6405386" cy="6362289"/>
           </a:xfrm>
         </p:spPr>
         <p:txBody>
           <a:bodyPr/>
           <a:lstStyle>
             <a:lvl1pPr>
-              <a:defRPr sz="3300"/>
+              <a:defRPr sz="3800"/>
             </a:lvl1pPr>
             <a:lvl2pPr>
-              <a:defRPr sz="2800"/>
+              <a:defRPr sz="3200"/>
             </a:lvl2pPr>
             <a:lvl3pPr>
-              <a:defRPr sz="2300"/>
+              <a:defRPr sz="2600"/>
             </a:lvl3pPr>
             <a:lvl4pPr>
-              <a:defRPr sz="2100"/>
+              <a:defRPr sz="2400"/>
             </a:lvl4pPr>
             <a:lvl5pPr>
-              <a:defRPr sz="2100"/>
+              <a:defRPr sz="2400"/>
             </a:lvl5pPr>
             <a:lvl6pPr>
-              <a:defRPr sz="2100"/>
+              <a:defRPr sz="2400"/>
             </a:lvl6pPr>
             <a:lvl7pPr>
-              <a:defRPr sz="2100"/>
+              <a:defRPr sz="2400"/>
             </a:lvl7pPr>
             <a:lvl8pPr>
-              <a:defRPr sz="2100"/>
+              <a:defRPr sz="2400"/>
             </a:lvl8pPr>
             <a:lvl9pPr>
-              <a:defRPr sz="2100"/>
+              <a:defRPr sz="2400"/>
             </a:lvl9pPr>
           </a:lstStyle>
           <a:p>
@@ -5132,39 +5132,39 @@
         </p:nvSpPr>
         <p:spPr>
           <a:xfrm>
-            <a:off x="5607141" y="3441217"/>
-            <a:ext cx="4898529" cy="9729880"/>
+            <a:off x="7331977" y="2250184"/>
+            <a:ext cx="6405386" cy="6362289"/>
           </a:xfrm>
         </p:spPr>
         <p:txBody>
           <a:bodyPr/>
           <a:lstStyle>
             <a:lvl1pPr>
-              <a:defRPr sz="3300"/>
+              <a:defRPr sz="3800"/>
             </a:lvl1pPr>
             <a:lvl2pPr>
-              <a:defRPr sz="2800"/>
+              <a:defRPr sz="3200"/>
             </a:lvl2pPr>
             <a:lvl3pPr>
-              <a:defRPr sz="2300"/>
+              <a:defRPr sz="2600"/>
             </a:lvl3pPr>
             <a:lvl4pPr>
-              <a:defRPr sz="2100"/>
+              <a:defRPr sz="2400"/>
             </a:lvl4pPr>
             <a:lvl5pPr>
-              <a:defRPr sz="2100"/>
+              <a:defRPr sz="2400"/>
             </a:lvl5pPr>
             <a:lvl6pPr>
-              <a:defRPr sz="2100"/>
+              <a:defRPr sz="2400"/>
             </a:lvl6pPr>
             <a:lvl7pPr>
-              <a:defRPr sz="2100"/>
+              <a:defRPr sz="2400"/>
             </a:lvl7pPr>
             <a:lvl8pPr>
-              <a:defRPr sz="2100"/>
+              <a:defRPr sz="2400"/>
             </a:lvl8pPr>
             <a:lvl9pPr>
-              <a:defRPr sz="2100"/>
+              <a:defRPr sz="2400"/>
             </a:lvl9pPr>
           </a:lstStyle>
           <a:p>
@@ -5222,7 +5222,7 @@
           <a:p>
             <a:fld id="{72234E71-0DA4-4CEC-8777-D274EF3906C1}" type="datetimeFigureOut">
               <a:rPr lang="en-US" smtClean="0"/>
-              <a:t>28/04/2019</a:t>
+              <a:t>18/05/2019</a:t>
             </a:fld>
             <a:endParaRPr lang="en-US"/>
           </a:p>
@@ -5312,8 +5312,8 @@
         </p:nvSpPr>
         <p:spPr>
           <a:xfrm>
-            <a:off x="468076" y="374896"/>
-            <a:ext cx="8425340" cy="1560249"/>
+            <a:off x="612063" y="245143"/>
+            <a:ext cx="11017092" cy="1020233"/>
           </a:xfrm>
         </p:spPr>
         <p:txBody>
@@ -5344,8 +5344,8 @@
         </p:nvSpPr>
         <p:spPr>
           <a:xfrm>
-            <a:off x="468075" y="2095504"/>
-            <a:ext cx="4136283" cy="873305"/>
+            <a:off x="612062" y="1370232"/>
+            <a:ext cx="5408662" cy="571047"/>
           </a:xfrm>
         </p:spPr>
         <p:txBody>
@@ -5353,39 +5353,39 @@
           <a:lstStyle>
             <a:lvl1pPr marL="0" indent="0">
               <a:buNone/>
-              <a:defRPr sz="2800" b="1"/>
+              <a:defRPr sz="3200" b="1"/>
             </a:lvl1pPr>
-            <a:lvl2pPr marL="534853" indent="0">
+            <a:lvl2pPr marL="606812" indent="0">
               <a:buNone/>
-              <a:defRPr sz="2300" b="1"/>
+              <a:defRPr sz="2600" b="1"/>
             </a:lvl2pPr>
-            <a:lvl3pPr marL="1069708" indent="0">
+            <a:lvl3pPr marL="1213628" indent="0">
+              <a:buNone/>
+              <a:defRPr sz="2400" b="1"/>
+            </a:lvl3pPr>
+            <a:lvl4pPr marL="1820440" indent="0">
               <a:buNone/>
               <a:defRPr sz="2100" b="1"/>
-            </a:lvl3pPr>
-            <a:lvl4pPr marL="1604561" indent="0">
+            </a:lvl4pPr>
+            <a:lvl5pPr marL="2427254" indent="0">
               <a:buNone/>
-              <a:defRPr sz="1900" b="1"/>
-            </a:lvl4pPr>
-            <a:lvl5pPr marL="2139414" indent="0">
+              <a:defRPr sz="2100" b="1"/>
+            </a:lvl5pPr>
+            <a:lvl6pPr marL="3034066" indent="0">
               <a:buNone/>
-              <a:defRPr sz="1900" b="1"/>
-            </a:lvl5pPr>
-            <a:lvl6pPr marL="2674267" indent="0">
+              <a:defRPr sz="2100" b="1"/>
+            </a:lvl6pPr>
+            <a:lvl7pPr marL="3640879" indent="0">
               <a:buNone/>
-              <a:defRPr sz="1900" b="1"/>
-            </a:lvl6pPr>
-            <a:lvl7pPr marL="3209120" indent="0">
+              <a:defRPr sz="2100" b="1"/>
+            </a:lvl7pPr>
+            <a:lvl8pPr marL="4247693" indent="0">
               <a:buNone/>
-              <a:defRPr sz="1900" b="1"/>
-            </a:lvl7pPr>
-            <a:lvl8pPr marL="3743974" indent="0">
+              <a:defRPr sz="2100" b="1"/>
+            </a:lvl8pPr>
+            <a:lvl9pPr marL="4854507" indent="0">
               <a:buNone/>
-              <a:defRPr sz="1900" b="1"/>
-            </a:lvl8pPr>
-            <a:lvl9pPr marL="4278828" indent="0">
-              <a:buNone/>
-              <a:defRPr sz="1900" b="1"/>
+              <a:defRPr sz="2100" b="1"/>
             </a:lvl9pPr>
           </a:lstStyle>
           <a:p>
@@ -5409,39 +5409,39 @@
         </p:nvSpPr>
         <p:spPr>
           <a:xfrm>
-            <a:off x="468075" y="2968806"/>
-            <a:ext cx="4136283" cy="5393692"/>
+            <a:off x="612062" y="1941278"/>
+            <a:ext cx="5408662" cy="3526891"/>
           </a:xfrm>
         </p:spPr>
         <p:txBody>
           <a:bodyPr/>
           <a:lstStyle>
             <a:lvl1pPr>
-              <a:defRPr sz="2800"/>
+              <a:defRPr sz="3200"/>
             </a:lvl1pPr>
             <a:lvl2pPr>
-              <a:defRPr sz="2300"/>
+              <a:defRPr sz="2600"/>
             </a:lvl2pPr>
             <a:lvl3pPr>
-              <a:defRPr sz="2100"/>
+              <a:defRPr sz="2400"/>
             </a:lvl3pPr>
             <a:lvl4pPr>
-              <a:defRPr sz="1900"/>
+              <a:defRPr sz="2100"/>
             </a:lvl4pPr>
             <a:lvl5pPr>
-              <a:defRPr sz="1900"/>
+              <a:defRPr sz="2100"/>
             </a:lvl5pPr>
             <a:lvl6pPr>
-              <a:defRPr sz="1900"/>
+              <a:defRPr sz="2100"/>
             </a:lvl6pPr>
             <a:lvl7pPr>
-              <a:defRPr sz="1900"/>
+              <a:defRPr sz="2100"/>
             </a:lvl7pPr>
             <a:lvl8pPr>
-              <a:defRPr sz="1900"/>
+              <a:defRPr sz="2100"/>
             </a:lvl8pPr>
             <a:lvl9pPr>
-              <a:defRPr sz="1900"/>
+              <a:defRPr sz="2100"/>
             </a:lvl9pPr>
           </a:lstStyle>
           <a:p>
@@ -5494,8 +5494,8 @@
         </p:nvSpPr>
         <p:spPr>
           <a:xfrm>
-            <a:off x="4755507" y="2095504"/>
-            <a:ext cx="4137909" cy="873305"/>
+            <a:off x="6218371" y="1370232"/>
+            <a:ext cx="5410787" cy="571047"/>
           </a:xfrm>
         </p:spPr>
         <p:txBody>
@@ -5503,39 +5503,39 @@
           <a:lstStyle>
             <a:lvl1pPr marL="0" indent="0">
               <a:buNone/>
-              <a:defRPr sz="2800" b="1"/>
+              <a:defRPr sz="3200" b="1"/>
             </a:lvl1pPr>
-            <a:lvl2pPr marL="534853" indent="0">
+            <a:lvl2pPr marL="606812" indent="0">
               <a:buNone/>
-              <a:defRPr sz="2300" b="1"/>
+              <a:defRPr sz="2600" b="1"/>
             </a:lvl2pPr>
-            <a:lvl3pPr marL="1069708" indent="0">
+            <a:lvl3pPr marL="1213628" indent="0">
+              <a:buNone/>
+              <a:defRPr sz="2400" b="1"/>
+            </a:lvl3pPr>
+            <a:lvl4pPr marL="1820440" indent="0">
               <a:buNone/>
               <a:defRPr sz="2100" b="1"/>
-            </a:lvl3pPr>
-            <a:lvl4pPr marL="1604561" indent="0">
+            </a:lvl4pPr>
+            <a:lvl5pPr marL="2427254" indent="0">
               <a:buNone/>
-              <a:defRPr sz="1900" b="1"/>
-            </a:lvl4pPr>
-            <a:lvl5pPr marL="2139414" indent="0">
+              <a:defRPr sz="2100" b="1"/>
+            </a:lvl5pPr>
+            <a:lvl6pPr marL="3034066" indent="0">
               <a:buNone/>
-              <a:defRPr sz="1900" b="1"/>
-            </a:lvl5pPr>
-            <a:lvl6pPr marL="2674267" indent="0">
+              <a:defRPr sz="2100" b="1"/>
+            </a:lvl6pPr>
+            <a:lvl7pPr marL="3640879" indent="0">
               <a:buNone/>
-              <a:defRPr sz="1900" b="1"/>
-            </a:lvl6pPr>
-            <a:lvl7pPr marL="3209120" indent="0">
+              <a:defRPr sz="2100" b="1"/>
+            </a:lvl7pPr>
+            <a:lvl8pPr marL="4247693" indent="0">
               <a:buNone/>
-              <a:defRPr sz="1900" b="1"/>
-            </a:lvl7pPr>
-            <a:lvl8pPr marL="3743974" indent="0">
+              <a:defRPr sz="2100" b="1"/>
+            </a:lvl8pPr>
+            <a:lvl9pPr marL="4854507" indent="0">
               <a:buNone/>
-              <a:defRPr sz="1900" b="1"/>
-            </a:lvl8pPr>
-            <a:lvl9pPr marL="4278828" indent="0">
-              <a:buNone/>
-              <a:defRPr sz="1900" b="1"/>
+              <a:defRPr sz="2100" b="1"/>
             </a:lvl9pPr>
           </a:lstStyle>
           <a:p>
@@ -5559,39 +5559,39 @@
         </p:nvSpPr>
         <p:spPr>
           <a:xfrm>
-            <a:off x="4755507" y="2968806"/>
-            <a:ext cx="4137909" cy="5393692"/>
+            <a:off x="6218371" y="1941278"/>
+            <a:ext cx="5410787" cy="3526891"/>
           </a:xfrm>
         </p:spPr>
         <p:txBody>
           <a:bodyPr/>
           <a:lstStyle>
             <a:lvl1pPr>
-              <a:defRPr sz="2800"/>
+              <a:defRPr sz="3200"/>
             </a:lvl1pPr>
             <a:lvl2pPr>
-              <a:defRPr sz="2300"/>
+              <a:defRPr sz="2600"/>
             </a:lvl2pPr>
             <a:lvl3pPr>
-              <a:defRPr sz="2100"/>
+              <a:defRPr sz="2400"/>
             </a:lvl3pPr>
             <a:lvl4pPr>
-              <a:defRPr sz="1900"/>
+              <a:defRPr sz="2100"/>
             </a:lvl4pPr>
             <a:lvl5pPr>
-              <a:defRPr sz="1900"/>
+              <a:defRPr sz="2100"/>
             </a:lvl5pPr>
             <a:lvl6pPr>
-              <a:defRPr sz="1900"/>
+              <a:defRPr sz="2100"/>
             </a:lvl6pPr>
             <a:lvl7pPr>
-              <a:defRPr sz="1900"/>
+              <a:defRPr sz="2100"/>
             </a:lvl7pPr>
             <a:lvl8pPr>
-              <a:defRPr sz="1900"/>
+              <a:defRPr sz="2100"/>
             </a:lvl8pPr>
             <a:lvl9pPr>
-              <a:defRPr sz="1900"/>
+              <a:defRPr sz="2100"/>
             </a:lvl9pPr>
           </a:lstStyle>
           <a:p>
@@ -5649,7 +5649,7 @@
           <a:p>
             <a:fld id="{72234E71-0DA4-4CEC-8777-D274EF3906C1}" type="datetimeFigureOut">
               <a:rPr lang="en-US" smtClean="0"/>
-              <a:t>28/04/2019</a:t>
+              <a:t>18/05/2019</a:t>
             </a:fld>
             <a:endParaRPr lang="en-US"/>
           </a:p>
@@ -5767,7 +5767,7 @@
           <a:p>
             <a:fld id="{72234E71-0DA4-4CEC-8777-D274EF3906C1}" type="datetimeFigureOut">
               <a:rPr lang="en-US" smtClean="0"/>
-              <a:t>28/04/2019</a:t>
+              <a:t>18/05/2019</a:t>
             </a:fld>
             <a:endParaRPr lang="en-US"/>
           </a:p>
@@ -5862,7 +5862,7 @@
           <a:p>
             <a:fld id="{72234E71-0DA4-4CEC-8777-D274EF3906C1}" type="datetimeFigureOut">
               <a:rPr lang="en-US" smtClean="0"/>
-              <a:t>28/04/2019</a:t>
+              <a:t>18/05/2019</a:t>
             </a:fld>
             <a:endParaRPr lang="en-US"/>
           </a:p>
@@ -5952,15 +5952,15 @@
         </p:nvSpPr>
         <p:spPr>
           <a:xfrm>
-            <a:off x="468076" y="372729"/>
-            <a:ext cx="3079865" cy="1586253"/>
+            <a:off x="612064" y="243725"/>
+            <a:ext cx="4027274" cy="1037238"/>
           </a:xfrm>
         </p:spPr>
         <p:txBody>
           <a:bodyPr anchor="b"/>
           <a:lstStyle>
             <a:lvl1pPr algn="l">
-              <a:defRPr sz="2300" b="1"/>
+              <a:defRPr sz="2600" b="1"/>
             </a:lvl1pPr>
           </a:lstStyle>
           <a:p>
@@ -5984,39 +5984,39 @@
         </p:nvSpPr>
         <p:spPr>
           <a:xfrm>
-            <a:off x="3660084" y="372730"/>
-            <a:ext cx="5233332" cy="7989771"/>
+            <a:off x="4785979" y="243726"/>
+            <a:ext cx="6843179" cy="5224446"/>
           </a:xfrm>
         </p:spPr>
         <p:txBody>
           <a:bodyPr/>
           <a:lstStyle>
             <a:lvl1pPr>
-              <a:defRPr sz="3700"/>
+              <a:defRPr sz="4200"/>
             </a:lvl1pPr>
             <a:lvl2pPr>
-              <a:defRPr sz="3300"/>
+              <a:defRPr sz="3800"/>
             </a:lvl2pPr>
             <a:lvl3pPr>
-              <a:defRPr sz="2800"/>
+              <a:defRPr sz="3200"/>
             </a:lvl3pPr>
             <a:lvl4pPr>
-              <a:defRPr sz="2300"/>
+              <a:defRPr sz="2600"/>
             </a:lvl4pPr>
             <a:lvl5pPr>
-              <a:defRPr sz="2300"/>
+              <a:defRPr sz="2600"/>
             </a:lvl5pPr>
             <a:lvl6pPr>
-              <a:defRPr sz="2300"/>
+              <a:defRPr sz="2600"/>
             </a:lvl6pPr>
             <a:lvl7pPr>
-              <a:defRPr sz="2300"/>
+              <a:defRPr sz="2600"/>
             </a:lvl7pPr>
             <a:lvl8pPr>
-              <a:defRPr sz="2300"/>
+              <a:defRPr sz="2600"/>
             </a:lvl8pPr>
             <a:lvl9pPr>
-              <a:defRPr sz="2300"/>
+              <a:defRPr sz="2600"/>
             </a:lvl9pPr>
           </a:lstStyle>
           <a:p>
@@ -6069,8 +6069,8 @@
         </p:nvSpPr>
         <p:spPr>
           <a:xfrm>
-            <a:off x="468076" y="1958978"/>
-            <a:ext cx="3079865" cy="6403518"/>
+            <a:off x="612064" y="1280959"/>
+            <a:ext cx="4027274" cy="4187208"/>
           </a:xfrm>
         </p:spPr>
         <p:txBody>
@@ -6078,39 +6078,39 @@
           <a:lstStyle>
             <a:lvl1pPr marL="0" indent="0">
               <a:buNone/>
+              <a:defRPr sz="1800"/>
+            </a:lvl1pPr>
+            <a:lvl2pPr marL="606812" indent="0">
+              <a:buNone/>
               <a:defRPr sz="1600"/>
-            </a:lvl1pPr>
-            <a:lvl2pPr marL="534853" indent="0">
+            </a:lvl2pPr>
+            <a:lvl3pPr marL="1213628" indent="0">
               <a:buNone/>
               <a:defRPr sz="1400"/>
-            </a:lvl2pPr>
-            <a:lvl3pPr marL="1069708" indent="0">
+            </a:lvl3pPr>
+            <a:lvl4pPr marL="1820440" indent="0">
               <a:buNone/>
-              <a:defRPr sz="1200"/>
-            </a:lvl3pPr>
-            <a:lvl4pPr marL="1604561" indent="0">
+              <a:defRPr sz="1100"/>
+            </a:lvl4pPr>
+            <a:lvl5pPr marL="2427254" indent="0">
               <a:buNone/>
-              <a:defRPr sz="1000"/>
-            </a:lvl4pPr>
-            <a:lvl5pPr marL="2139414" indent="0">
+              <a:defRPr sz="1100"/>
+            </a:lvl5pPr>
+            <a:lvl6pPr marL="3034066" indent="0">
               <a:buNone/>
-              <a:defRPr sz="1000"/>
-            </a:lvl5pPr>
-            <a:lvl6pPr marL="2674267" indent="0">
+              <a:defRPr sz="1100"/>
+            </a:lvl6pPr>
+            <a:lvl7pPr marL="3640879" indent="0">
               <a:buNone/>
-              <a:defRPr sz="1000"/>
-            </a:lvl6pPr>
-            <a:lvl7pPr marL="3209120" indent="0">
+              <a:defRPr sz="1100"/>
+            </a:lvl7pPr>
+            <a:lvl8pPr marL="4247693" indent="0">
               <a:buNone/>
-              <a:defRPr sz="1000"/>
-            </a:lvl7pPr>
-            <a:lvl8pPr marL="3743974" indent="0">
+              <a:defRPr sz="1100"/>
+            </a:lvl8pPr>
+            <a:lvl9pPr marL="4854507" indent="0">
               <a:buNone/>
-              <a:defRPr sz="1000"/>
-            </a:lvl8pPr>
-            <a:lvl9pPr marL="4278828" indent="0">
-              <a:buNone/>
-              <a:defRPr sz="1000"/>
+              <a:defRPr sz="1100"/>
             </a:lvl9pPr>
           </a:lstStyle>
           <a:p>
@@ -6139,7 +6139,7 @@
           <a:p>
             <a:fld id="{72234E71-0DA4-4CEC-8777-D274EF3906C1}" type="datetimeFigureOut">
               <a:rPr lang="en-US" smtClean="0"/>
-              <a:t>28/04/2019</a:t>
+              <a:t>18/05/2019</a:t>
             </a:fld>
             <a:endParaRPr lang="en-US"/>
           </a:p>
@@ -6229,15 +6229,15 @@
         </p:nvSpPr>
         <p:spPr>
           <a:xfrm>
-            <a:off x="1834916" y="6553043"/>
-            <a:ext cx="5616893" cy="773623"/>
+            <a:off x="2399363" y="4284982"/>
+            <a:ext cx="7344728" cy="505865"/>
           </a:xfrm>
         </p:spPr>
         <p:txBody>
           <a:bodyPr anchor="b"/>
           <a:lstStyle>
             <a:lvl1pPr algn="l">
-              <a:defRPr sz="2300" b="1"/>
+              <a:defRPr sz="2600" b="1"/>
             </a:lvl1pPr>
           </a:lstStyle>
           <a:p>
@@ -6261,8 +6261,8 @@
         </p:nvSpPr>
         <p:spPr>
           <a:xfrm>
-            <a:off x="1834916" y="836468"/>
-            <a:ext cx="5616893" cy="5616893"/>
+            <a:off x="2399363" y="546960"/>
+            <a:ext cx="7344728" cy="3672840"/>
           </a:xfrm>
         </p:spPr>
         <p:txBody>
@@ -6270,39 +6270,39 @@
           <a:lstStyle>
             <a:lvl1pPr marL="0" indent="0">
               <a:buNone/>
-              <a:defRPr sz="3700"/>
+              <a:defRPr sz="4200"/>
             </a:lvl1pPr>
-            <a:lvl2pPr marL="534853" indent="0">
+            <a:lvl2pPr marL="606812" indent="0">
               <a:buNone/>
-              <a:defRPr sz="3300"/>
+              <a:defRPr sz="3800"/>
             </a:lvl2pPr>
-            <a:lvl3pPr marL="1069708" indent="0">
+            <a:lvl3pPr marL="1213628" indent="0">
               <a:buNone/>
-              <a:defRPr sz="2800"/>
+              <a:defRPr sz="3200"/>
             </a:lvl3pPr>
-            <a:lvl4pPr marL="1604561" indent="0">
+            <a:lvl4pPr marL="1820440" indent="0">
               <a:buNone/>
-              <a:defRPr sz="2300"/>
+              <a:defRPr sz="2600"/>
             </a:lvl4pPr>
-            <a:lvl5pPr marL="2139414" indent="0">
+            <a:lvl5pPr marL="2427254" indent="0">
               <a:buNone/>
-              <a:defRPr sz="2300"/>
+              <a:defRPr sz="2600"/>
             </a:lvl5pPr>
-            <a:lvl6pPr marL="2674267" indent="0">
+            <a:lvl6pPr marL="3034066" indent="0">
               <a:buNone/>
-              <a:defRPr sz="2300"/>
+              <a:defRPr sz="2600"/>
             </a:lvl6pPr>
-            <a:lvl7pPr marL="3209120" indent="0">
+            <a:lvl7pPr marL="3640879" indent="0">
               <a:buNone/>
-              <a:defRPr sz="2300"/>
+              <a:defRPr sz="2600"/>
             </a:lvl7pPr>
-            <a:lvl8pPr marL="3743974" indent="0">
+            <a:lvl8pPr marL="4247693" indent="0">
               <a:buNone/>
-              <a:defRPr sz="2300"/>
+              <a:defRPr sz="2600"/>
             </a:lvl8pPr>
-            <a:lvl9pPr marL="4278828" indent="0">
+            <a:lvl9pPr marL="4854507" indent="0">
               <a:buNone/>
-              <a:defRPr sz="2300"/>
+              <a:defRPr sz="2600"/>
             </a:lvl9pPr>
           </a:lstStyle>
           <a:p>
@@ -6322,8 +6322,8 @@
         </p:nvSpPr>
         <p:spPr>
           <a:xfrm>
-            <a:off x="1834916" y="7326665"/>
-            <a:ext cx="5616893" cy="1098675"/>
+            <a:off x="2399363" y="4790846"/>
+            <a:ext cx="7344728" cy="718415"/>
           </a:xfrm>
         </p:spPr>
         <p:txBody>
@@ -6331,39 +6331,39 @@
           <a:lstStyle>
             <a:lvl1pPr marL="0" indent="0">
               <a:buNone/>
+              <a:defRPr sz="1800"/>
+            </a:lvl1pPr>
+            <a:lvl2pPr marL="606812" indent="0">
+              <a:buNone/>
               <a:defRPr sz="1600"/>
-            </a:lvl1pPr>
-            <a:lvl2pPr marL="534853" indent="0">
+            </a:lvl2pPr>
+            <a:lvl3pPr marL="1213628" indent="0">
               <a:buNone/>
               <a:defRPr sz="1400"/>
-            </a:lvl2pPr>
-            <a:lvl3pPr marL="1069708" indent="0">
+            </a:lvl3pPr>
+            <a:lvl4pPr marL="1820440" indent="0">
               <a:buNone/>
-              <a:defRPr sz="1200"/>
-            </a:lvl3pPr>
-            <a:lvl4pPr marL="1604561" indent="0">
+              <a:defRPr sz="1100"/>
+            </a:lvl4pPr>
+            <a:lvl5pPr marL="2427254" indent="0">
               <a:buNone/>
-              <a:defRPr sz="1000"/>
-            </a:lvl4pPr>
-            <a:lvl5pPr marL="2139414" indent="0">
+              <a:defRPr sz="1100"/>
+            </a:lvl5pPr>
+            <a:lvl6pPr marL="3034066" indent="0">
               <a:buNone/>
-              <a:defRPr sz="1000"/>
-            </a:lvl5pPr>
-            <a:lvl6pPr marL="2674267" indent="0">
+              <a:defRPr sz="1100"/>
+            </a:lvl6pPr>
+            <a:lvl7pPr marL="3640879" indent="0">
               <a:buNone/>
-              <a:defRPr sz="1000"/>
-            </a:lvl6pPr>
-            <a:lvl7pPr marL="3209120" indent="0">
+              <a:defRPr sz="1100"/>
+            </a:lvl7pPr>
+            <a:lvl8pPr marL="4247693" indent="0">
               <a:buNone/>
-              <a:defRPr sz="1000"/>
-            </a:lvl7pPr>
-            <a:lvl8pPr marL="3743974" indent="0">
+              <a:defRPr sz="1100"/>
+            </a:lvl8pPr>
+            <a:lvl9pPr marL="4854507" indent="0">
               <a:buNone/>
-              <a:defRPr sz="1000"/>
-            </a:lvl8pPr>
-            <a:lvl9pPr marL="4278828" indent="0">
-              <a:buNone/>
-              <a:defRPr sz="1000"/>
+              <a:defRPr sz="1100"/>
             </a:lvl9pPr>
           </a:lstStyle>
           <a:p>
@@ -6392,7 +6392,7 @@
           <a:p>
             <a:fld id="{72234E71-0DA4-4CEC-8777-D274EF3906C1}" type="datetimeFigureOut">
               <a:rPr lang="en-US" smtClean="0"/>
-              <a:t>28/04/2019</a:t>
+              <a:t>18/05/2019</a:t>
             </a:fld>
             <a:endParaRPr lang="en-US"/>
           </a:p>
@@ -6487,15 +6487,15 @@
         </p:nvSpPr>
         <p:spPr>
           <a:xfrm>
-            <a:off x="468076" y="374896"/>
-            <a:ext cx="8425340" cy="1560249"/>
+            <a:off x="612063" y="245143"/>
+            <a:ext cx="11017092" cy="1020233"/>
           </a:xfrm>
           <a:prstGeom prst="rect">
             <a:avLst/>
           </a:prstGeom>
         </p:spPr>
         <p:txBody>
-          <a:bodyPr vert="horz" lIns="106971" tIns="53485" rIns="106971" bIns="53485" rtlCol="0" anchor="ctr">
+          <a:bodyPr vert="horz" lIns="121363" tIns="60681" rIns="121363" bIns="60681" rtlCol="0" anchor="ctr">
             <a:normAutofit/>
           </a:bodyPr>
           <a:lstStyle/>
@@ -6520,15 +6520,15 @@
         </p:nvSpPr>
         <p:spPr>
           <a:xfrm>
-            <a:off x="468076" y="2184349"/>
-            <a:ext cx="8425340" cy="6178150"/>
+            <a:off x="612063" y="1428328"/>
+            <a:ext cx="11017092" cy="4039842"/>
           </a:xfrm>
           <a:prstGeom prst="rect">
             <a:avLst/>
           </a:prstGeom>
         </p:spPr>
         <p:txBody>
-          <a:bodyPr vert="horz" lIns="106971" tIns="53485" rIns="106971" bIns="53485" rtlCol="0">
+          <a:bodyPr vert="horz" lIns="121363" tIns="60681" rIns="121363" bIns="60681" rtlCol="0">
             <a:normAutofit/>
           </a:bodyPr>
           <a:lstStyle/>
@@ -6582,18 +6582,18 @@
         </p:nvSpPr>
         <p:spPr>
           <a:xfrm>
-            <a:off x="468077" y="8676716"/>
-            <a:ext cx="2184348" cy="498413"/>
+            <a:off x="612065" y="5673634"/>
+            <a:ext cx="2856284" cy="325909"/>
           </a:xfrm>
           <a:prstGeom prst="rect">
             <a:avLst/>
           </a:prstGeom>
         </p:spPr>
         <p:txBody>
-          <a:bodyPr vert="horz" lIns="106971" tIns="53485" rIns="106971" bIns="53485" rtlCol="0" anchor="ctr"/>
+          <a:bodyPr vert="horz" lIns="121363" tIns="60681" rIns="121363" bIns="60681" rtlCol="0" anchor="ctr"/>
           <a:lstStyle>
             <a:lvl1pPr algn="l">
-              <a:defRPr sz="1400">
+              <a:defRPr sz="1600">
                 <a:solidFill>
                   <a:schemeClr val="tx1">
                     <a:tint val="75000"/>
@@ -6605,7 +6605,7 @@
           <a:p>
             <a:fld id="{72234E71-0DA4-4CEC-8777-D274EF3906C1}" type="datetimeFigureOut">
               <a:rPr lang="en-US" smtClean="0"/>
-              <a:t>28/04/2019</a:t>
+              <a:t>18/05/2019</a:t>
             </a:fld>
             <a:endParaRPr lang="en-US"/>
           </a:p>
@@ -6623,18 +6623,18 @@
         </p:nvSpPr>
         <p:spPr>
           <a:xfrm>
-            <a:off x="3198509" y="8676716"/>
-            <a:ext cx="2964471" cy="498413"/>
+            <a:off x="4182419" y="5673634"/>
+            <a:ext cx="3876383" cy="325909"/>
           </a:xfrm>
           <a:prstGeom prst="rect">
             <a:avLst/>
           </a:prstGeom>
         </p:spPr>
         <p:txBody>
-          <a:bodyPr vert="horz" lIns="106971" tIns="53485" rIns="106971" bIns="53485" rtlCol="0" anchor="ctr"/>
+          <a:bodyPr vert="horz" lIns="121363" tIns="60681" rIns="121363" bIns="60681" rtlCol="0" anchor="ctr"/>
           <a:lstStyle>
             <a:lvl1pPr algn="ctr">
-              <a:defRPr sz="1400">
+              <a:defRPr sz="1600">
                 <a:solidFill>
                   <a:schemeClr val="tx1">
                     <a:tint val="75000"/>
@@ -6660,18 +6660,18 @@
         </p:nvSpPr>
         <p:spPr>
           <a:xfrm>
-            <a:off x="6709068" y="8676716"/>
-            <a:ext cx="2184348" cy="498413"/>
+            <a:off x="8772872" y="5673634"/>
+            <a:ext cx="2856284" cy="325909"/>
           </a:xfrm>
           <a:prstGeom prst="rect">
             <a:avLst/>
           </a:prstGeom>
         </p:spPr>
         <p:txBody>
-          <a:bodyPr vert="horz" lIns="106971" tIns="53485" rIns="106971" bIns="53485" rtlCol="0" anchor="ctr"/>
+          <a:bodyPr vert="horz" lIns="121363" tIns="60681" rIns="121363" bIns="60681" rtlCol="0" anchor="ctr"/>
           <a:lstStyle>
             <a:lvl1pPr algn="r">
-              <a:defRPr sz="1400">
+              <a:defRPr sz="1600">
                 <a:solidFill>
                   <a:schemeClr val="tx1">
                     <a:tint val="75000"/>
@@ -6712,12 +6712,12 @@
   </p:sldLayoutIdLst>
   <p:txStyles>
     <p:titleStyle>
-      <a:lvl1pPr algn="ctr" defTabSz="1069708" rtl="0" eaLnBrk="1" latinLnBrk="0" hangingPunct="1">
+      <a:lvl1pPr algn="ctr" defTabSz="1213628" rtl="0" eaLnBrk="1" latinLnBrk="0" hangingPunct="1">
         <a:spcBef>
           <a:spcPct val="0"/>
         </a:spcBef>
         <a:buNone/>
-        <a:defRPr sz="5100" kern="1200">
+        <a:defRPr sz="5800" kern="1200">
           <a:solidFill>
             <a:schemeClr val="tx1"/>
           </a:solidFill>
@@ -6728,13 +6728,13 @@
       </a:lvl1pPr>
     </p:titleStyle>
     <p:bodyStyle>
-      <a:lvl1pPr marL="401140" indent="-401140" algn="l" defTabSz="1069708" rtl="0" eaLnBrk="1" latinLnBrk="0" hangingPunct="1">
+      <a:lvl1pPr marL="455110" indent="-455110" algn="l" defTabSz="1213628" rtl="0" eaLnBrk="1" latinLnBrk="0" hangingPunct="1">
         <a:spcBef>
           <a:spcPct val="20000"/>
         </a:spcBef>
         <a:buFont typeface="Arial" panose="020B0604020202020204" pitchFamily="34" charset="0"/>
         <a:buChar char="•"/>
-        <a:defRPr sz="3700" kern="1200">
+        <a:defRPr sz="4200" kern="1200">
           <a:solidFill>
             <a:schemeClr val="tx1"/>
           </a:solidFill>
@@ -6743,13 +6743,13 @@
           <a:cs typeface="+mn-cs"/>
         </a:defRPr>
       </a:lvl1pPr>
-      <a:lvl2pPr marL="869138" indent="-334284" algn="l" defTabSz="1069708" rtl="0" eaLnBrk="1" latinLnBrk="0" hangingPunct="1">
+      <a:lvl2pPr marL="986073" indent="-379259" algn="l" defTabSz="1213628" rtl="0" eaLnBrk="1" latinLnBrk="0" hangingPunct="1">
         <a:spcBef>
           <a:spcPct val="20000"/>
         </a:spcBef>
         <a:buFont typeface="Arial" panose="020B0604020202020204" pitchFamily="34" charset="0"/>
         <a:buChar char="–"/>
-        <a:defRPr sz="3300" kern="1200">
+        <a:defRPr sz="3800" kern="1200">
           <a:solidFill>
             <a:schemeClr val="tx1"/>
           </a:solidFill>
@@ -6758,13 +6758,13 @@
           <a:cs typeface="+mn-cs"/>
         </a:defRPr>
       </a:lvl2pPr>
-      <a:lvl3pPr marL="1337133" indent="-267426" algn="l" defTabSz="1069708" rtl="0" eaLnBrk="1" latinLnBrk="0" hangingPunct="1">
+      <a:lvl3pPr marL="1517032" indent="-303406" algn="l" defTabSz="1213628" rtl="0" eaLnBrk="1" latinLnBrk="0" hangingPunct="1">
         <a:spcBef>
           <a:spcPct val="20000"/>
         </a:spcBef>
         <a:buFont typeface="Arial" panose="020B0604020202020204" pitchFamily="34" charset="0"/>
         <a:buChar char="•"/>
-        <a:defRPr sz="2800" kern="1200">
+        <a:defRPr sz="3200" kern="1200">
           <a:solidFill>
             <a:schemeClr val="tx1"/>
           </a:solidFill>
@@ -6773,13 +6773,13 @@
           <a:cs typeface="+mn-cs"/>
         </a:defRPr>
       </a:lvl3pPr>
-      <a:lvl4pPr marL="1871987" indent="-267426" algn="l" defTabSz="1069708" rtl="0" eaLnBrk="1" latinLnBrk="0" hangingPunct="1">
+      <a:lvl4pPr marL="2123846" indent="-303406" algn="l" defTabSz="1213628" rtl="0" eaLnBrk="1" latinLnBrk="0" hangingPunct="1">
         <a:spcBef>
           <a:spcPct val="20000"/>
         </a:spcBef>
         <a:buFont typeface="Arial" panose="020B0604020202020204" pitchFamily="34" charset="0"/>
         <a:buChar char="–"/>
-        <a:defRPr sz="2300" kern="1200">
+        <a:defRPr sz="2600" kern="1200">
           <a:solidFill>
             <a:schemeClr val="tx1"/>
           </a:solidFill>
@@ -6788,13 +6788,13 @@
           <a:cs typeface="+mn-cs"/>
         </a:defRPr>
       </a:lvl4pPr>
-      <a:lvl5pPr marL="2406840" indent="-267426" algn="l" defTabSz="1069708" rtl="0" eaLnBrk="1" latinLnBrk="0" hangingPunct="1">
+      <a:lvl5pPr marL="2730660" indent="-303406" algn="l" defTabSz="1213628" rtl="0" eaLnBrk="1" latinLnBrk="0" hangingPunct="1">
         <a:spcBef>
           <a:spcPct val="20000"/>
         </a:spcBef>
         <a:buFont typeface="Arial" panose="020B0604020202020204" pitchFamily="34" charset="0"/>
         <a:buChar char="»"/>
-        <a:defRPr sz="2300" kern="1200">
+        <a:defRPr sz="2600" kern="1200">
           <a:solidFill>
             <a:schemeClr val="tx1"/>
           </a:solidFill>
@@ -6803,13 +6803,13 @@
           <a:cs typeface="+mn-cs"/>
         </a:defRPr>
       </a:lvl5pPr>
-      <a:lvl6pPr marL="2941694" indent="-267426" algn="l" defTabSz="1069708" rtl="0" eaLnBrk="1" latinLnBrk="0" hangingPunct="1">
+      <a:lvl6pPr marL="3337474" indent="-303406" algn="l" defTabSz="1213628" rtl="0" eaLnBrk="1" latinLnBrk="0" hangingPunct="1">
         <a:spcBef>
           <a:spcPct val="20000"/>
         </a:spcBef>
         <a:buFont typeface="Arial" panose="020B0604020202020204" pitchFamily="34" charset="0"/>
         <a:buChar char="•"/>
-        <a:defRPr sz="2300" kern="1200">
+        <a:defRPr sz="2600" kern="1200">
           <a:solidFill>
             <a:schemeClr val="tx1"/>
           </a:solidFill>
@@ -6818,13 +6818,13 @@
           <a:cs typeface="+mn-cs"/>
         </a:defRPr>
       </a:lvl6pPr>
-      <a:lvl7pPr marL="3476548" indent="-267426" algn="l" defTabSz="1069708" rtl="0" eaLnBrk="1" latinLnBrk="0" hangingPunct="1">
+      <a:lvl7pPr marL="3944287" indent="-303406" algn="l" defTabSz="1213628" rtl="0" eaLnBrk="1" latinLnBrk="0" hangingPunct="1">
         <a:spcBef>
           <a:spcPct val="20000"/>
         </a:spcBef>
         <a:buFont typeface="Arial" panose="020B0604020202020204" pitchFamily="34" charset="0"/>
         <a:buChar char="•"/>
-        <a:defRPr sz="2300" kern="1200">
+        <a:defRPr sz="2600" kern="1200">
           <a:solidFill>
             <a:schemeClr val="tx1"/>
           </a:solidFill>
@@ -6833,13 +6833,13 @@
           <a:cs typeface="+mn-cs"/>
         </a:defRPr>
       </a:lvl7pPr>
-      <a:lvl8pPr marL="4011400" indent="-267426" algn="l" defTabSz="1069708" rtl="0" eaLnBrk="1" latinLnBrk="0" hangingPunct="1">
+      <a:lvl8pPr marL="4551098" indent="-303406" algn="l" defTabSz="1213628" rtl="0" eaLnBrk="1" latinLnBrk="0" hangingPunct="1">
         <a:spcBef>
           <a:spcPct val="20000"/>
         </a:spcBef>
         <a:buFont typeface="Arial" panose="020B0604020202020204" pitchFamily="34" charset="0"/>
         <a:buChar char="•"/>
-        <a:defRPr sz="2300" kern="1200">
+        <a:defRPr sz="2600" kern="1200">
           <a:solidFill>
             <a:schemeClr val="tx1"/>
           </a:solidFill>
@@ -6848,13 +6848,13 @@
           <a:cs typeface="+mn-cs"/>
         </a:defRPr>
       </a:lvl8pPr>
-      <a:lvl9pPr marL="4546254" indent="-267426" algn="l" defTabSz="1069708" rtl="0" eaLnBrk="1" latinLnBrk="0" hangingPunct="1">
+      <a:lvl9pPr marL="5157912" indent="-303406" algn="l" defTabSz="1213628" rtl="0" eaLnBrk="1" latinLnBrk="0" hangingPunct="1">
         <a:spcBef>
           <a:spcPct val="20000"/>
         </a:spcBef>
         <a:buFont typeface="Arial" panose="020B0604020202020204" pitchFamily="34" charset="0"/>
         <a:buChar char="•"/>
-        <a:defRPr sz="2300" kern="1200">
+        <a:defRPr sz="2600" kern="1200">
           <a:solidFill>
             <a:schemeClr val="tx1"/>
           </a:solidFill>
@@ -6868,8 +6868,8 @@
       <a:defPPr>
         <a:defRPr lang="en-US"/>
       </a:defPPr>
-      <a:lvl1pPr marL="0" algn="l" defTabSz="1069708" rtl="0" eaLnBrk="1" latinLnBrk="0" hangingPunct="1">
-        <a:defRPr sz="2100" kern="1200">
+      <a:lvl1pPr marL="0" algn="l" defTabSz="1213628" rtl="0" eaLnBrk="1" latinLnBrk="0" hangingPunct="1">
+        <a:defRPr sz="2400" kern="1200">
           <a:solidFill>
             <a:schemeClr val="tx1"/>
           </a:solidFill>
@@ -6878,8 +6878,8 @@
           <a:cs typeface="+mn-cs"/>
         </a:defRPr>
       </a:lvl1pPr>
-      <a:lvl2pPr marL="534853" algn="l" defTabSz="1069708" rtl="0" eaLnBrk="1" latinLnBrk="0" hangingPunct="1">
-        <a:defRPr sz="2100" kern="1200">
+      <a:lvl2pPr marL="606812" algn="l" defTabSz="1213628" rtl="0" eaLnBrk="1" latinLnBrk="0" hangingPunct="1">
+        <a:defRPr sz="2400" kern="1200">
           <a:solidFill>
             <a:schemeClr val="tx1"/>
           </a:solidFill>
@@ -6888,8 +6888,8 @@
           <a:cs typeface="+mn-cs"/>
         </a:defRPr>
       </a:lvl2pPr>
-      <a:lvl3pPr marL="1069708" algn="l" defTabSz="1069708" rtl="0" eaLnBrk="1" latinLnBrk="0" hangingPunct="1">
-        <a:defRPr sz="2100" kern="1200">
+      <a:lvl3pPr marL="1213628" algn="l" defTabSz="1213628" rtl="0" eaLnBrk="1" latinLnBrk="0" hangingPunct="1">
+        <a:defRPr sz="2400" kern="1200">
           <a:solidFill>
             <a:schemeClr val="tx1"/>
           </a:solidFill>
@@ -6898,8 +6898,8 @@
           <a:cs typeface="+mn-cs"/>
         </a:defRPr>
       </a:lvl3pPr>
-      <a:lvl4pPr marL="1604561" algn="l" defTabSz="1069708" rtl="0" eaLnBrk="1" latinLnBrk="0" hangingPunct="1">
-        <a:defRPr sz="2100" kern="1200">
+      <a:lvl4pPr marL="1820440" algn="l" defTabSz="1213628" rtl="0" eaLnBrk="1" latinLnBrk="0" hangingPunct="1">
+        <a:defRPr sz="2400" kern="1200">
           <a:solidFill>
             <a:schemeClr val="tx1"/>
           </a:solidFill>
@@ -6908,8 +6908,8 @@
           <a:cs typeface="+mn-cs"/>
         </a:defRPr>
       </a:lvl4pPr>
-      <a:lvl5pPr marL="2139414" algn="l" defTabSz="1069708" rtl="0" eaLnBrk="1" latinLnBrk="0" hangingPunct="1">
-        <a:defRPr sz="2100" kern="1200">
+      <a:lvl5pPr marL="2427254" algn="l" defTabSz="1213628" rtl="0" eaLnBrk="1" latinLnBrk="0" hangingPunct="1">
+        <a:defRPr sz="2400" kern="1200">
           <a:solidFill>
             <a:schemeClr val="tx1"/>
           </a:solidFill>
@@ -6918,8 +6918,8 @@
           <a:cs typeface="+mn-cs"/>
         </a:defRPr>
       </a:lvl5pPr>
-      <a:lvl6pPr marL="2674267" algn="l" defTabSz="1069708" rtl="0" eaLnBrk="1" latinLnBrk="0" hangingPunct="1">
-        <a:defRPr sz="2100" kern="1200">
+      <a:lvl6pPr marL="3034066" algn="l" defTabSz="1213628" rtl="0" eaLnBrk="1" latinLnBrk="0" hangingPunct="1">
+        <a:defRPr sz="2400" kern="1200">
           <a:solidFill>
             <a:schemeClr val="tx1"/>
           </a:solidFill>
@@ -6928,8 +6928,8 @@
           <a:cs typeface="+mn-cs"/>
         </a:defRPr>
       </a:lvl6pPr>
-      <a:lvl7pPr marL="3209120" algn="l" defTabSz="1069708" rtl="0" eaLnBrk="1" latinLnBrk="0" hangingPunct="1">
-        <a:defRPr sz="2100" kern="1200">
+      <a:lvl7pPr marL="3640879" algn="l" defTabSz="1213628" rtl="0" eaLnBrk="1" latinLnBrk="0" hangingPunct="1">
+        <a:defRPr sz="2400" kern="1200">
           <a:solidFill>
             <a:schemeClr val="tx1"/>
           </a:solidFill>
@@ -6938,8 +6938,8 @@
           <a:cs typeface="+mn-cs"/>
         </a:defRPr>
       </a:lvl7pPr>
-      <a:lvl8pPr marL="3743974" algn="l" defTabSz="1069708" rtl="0" eaLnBrk="1" latinLnBrk="0" hangingPunct="1">
-        <a:defRPr sz="2100" kern="1200">
+      <a:lvl8pPr marL="4247693" algn="l" defTabSz="1213628" rtl="0" eaLnBrk="1" latinLnBrk="0" hangingPunct="1">
+        <a:defRPr sz="2400" kern="1200">
           <a:solidFill>
             <a:schemeClr val="tx1"/>
           </a:solidFill>
@@ -6948,8 +6948,8 @@
           <a:cs typeface="+mn-cs"/>
         </a:defRPr>
       </a:lvl8pPr>
-      <a:lvl9pPr marL="4278828" algn="l" defTabSz="1069708" rtl="0" eaLnBrk="1" latinLnBrk="0" hangingPunct="1">
-        <a:defRPr sz="2100" kern="1200">
+      <a:lvl9pPr marL="4854507" algn="l" defTabSz="1213628" rtl="0" eaLnBrk="1" latinLnBrk="0" hangingPunct="1">
+        <a:defRPr sz="2400" kern="1200">
           <a:solidFill>
             <a:schemeClr val="tx1"/>
           </a:solidFill>
@@ -6982,30 +6982,74 @@
       </p:grpSpPr>
       <p:sp>
         <p:nvSpPr>
-          <p:cNvPr id="71" name="Right Arrow 70"/>
+          <p:cNvPr id="176" name="Can 175"/>
           <p:cNvSpPr/>
           <p:nvPr/>
         </p:nvSpPr>
         <p:spPr>
-          <a:xfrm flipH="1">
-            <a:off x="2577277" y="4470249"/>
-            <a:ext cx="809984" cy="432048"/>
+          <a:xfrm>
+            <a:off x="1473044" y="178192"/>
+            <a:ext cx="2052228" cy="849522"/>
           </a:xfrm>
-          <a:prstGeom prst="rightArrow">
+          <a:prstGeom prst="can">
+            <a:avLst/>
+          </a:prstGeom>
+          <a:ln w="19050">
+            <a:solidFill>
+              <a:schemeClr val="tx1"/>
+            </a:solidFill>
+          </a:ln>
+        </p:spPr>
+        <p:style>
+          <a:lnRef idx="2">
+            <a:schemeClr val="dk1"/>
+          </a:lnRef>
+          <a:fillRef idx="1">
+            <a:schemeClr val="lt1"/>
+          </a:fillRef>
+          <a:effectRef idx="0">
+            <a:schemeClr val="dk1"/>
+          </a:effectRef>
+          <a:fontRef idx="minor">
+            <a:schemeClr val="dk1"/>
+          </a:fontRef>
+        </p:style>
+        <p:txBody>
+          <a:bodyPr lIns="91436" tIns="45718" rIns="91436" bIns="45718" rtlCol="0" anchor="ctr"/>
+          <a:lstStyle/>
+          <a:p>
+            <a:pPr algn="ctr"/>
+            <a:r>
+              <a:rPr lang="en-US" sz="2000" dirty="0">
+                <a:latin typeface="CMU Serif" panose="02000603000000000000" pitchFamily="2" charset="0"/>
+                <a:ea typeface="CMU Serif" panose="02000603000000000000" pitchFamily="2" charset="0"/>
+                <a:cs typeface="CMU Serif" panose="02000603000000000000" pitchFamily="2" charset="0"/>
+              </a:rPr>
+              <a:t>Historical data</a:t>
+            </a:r>
+          </a:p>
+        </p:txBody>
+      </p:sp>
+      <p:sp>
+        <p:nvSpPr>
+          <p:cNvPr id="177" name="Oval 176"/>
+          <p:cNvSpPr/>
+          <p:nvPr/>
+        </p:nvSpPr>
+        <p:spPr>
+          <a:xfrm>
+            <a:off x="1347030" y="2171453"/>
+            <a:ext cx="2304256" cy="1152128"/>
+          </a:xfrm>
+          <a:prstGeom prst="ellipse">
             <a:avLst/>
           </a:prstGeom>
           <a:solidFill>
-            <a:schemeClr val="accent1">
-              <a:lumMod val="60000"/>
-              <a:lumOff val="40000"/>
-            </a:schemeClr>
+            <a:srgbClr val="67A3EB"/>
           </a:solidFill>
-          <a:ln>
+          <a:ln w="19050">
             <a:solidFill>
-              <a:schemeClr val="tx2">
-                <a:lumMod val="60000"/>
-                <a:lumOff val="40000"/>
-              </a:schemeClr>
+              <a:schemeClr val="tx1"/>
             </a:solidFill>
           </a:ln>
         </p:spPr>
@@ -7030,93 +7074,40 @@
           <a:lstStyle/>
           <a:p>
             <a:pPr algn="ctr"/>
-            <a:endParaRPr lang="en-US" sz="1800">
-              <a:latin typeface="CMU Serif" panose="02000603000000000000" pitchFamily="2" charset="0"/>
-              <a:ea typeface="CMU Serif" panose="02000603000000000000" pitchFamily="2" charset="0"/>
-              <a:cs typeface="CMU Serif" panose="02000603000000000000" pitchFamily="2" charset="0"/>
-            </a:endParaRPr>
+            <a:r>
+              <a:rPr lang="en-US" sz="2000" dirty="0">
+                <a:solidFill>
+                  <a:schemeClr val="tx1"/>
+                </a:solidFill>
+                <a:latin typeface="CMU Serif" panose="02000603000000000000" pitchFamily="2" charset="0"/>
+                <a:ea typeface="CMU Serif" panose="02000603000000000000" pitchFamily="2" charset="0"/>
+                <a:cs typeface="CMU Serif" panose="02000603000000000000" pitchFamily="2" charset="0"/>
+              </a:rPr>
+              <a:t>Data mining </a:t>
+            </a:r>
           </a:p>
         </p:txBody>
       </p:sp>
       <p:sp>
         <p:nvSpPr>
-          <p:cNvPr id="72" name="Can 71"/>
+          <p:cNvPr id="178" name="Oval 177"/>
           <p:cNvSpPr/>
           <p:nvPr/>
         </p:nvSpPr>
         <p:spPr>
           <a:xfrm>
-            <a:off x="3708637" y="43619"/>
-            <a:ext cx="2052228" cy="849522"/>
-          </a:xfrm>
-          <a:prstGeom prst="can">
-            <a:avLst/>
-          </a:prstGeom>
-          <a:ln>
-            <a:solidFill>
-              <a:schemeClr val="tx2">
-                <a:lumMod val="60000"/>
-                <a:lumOff val="40000"/>
-              </a:schemeClr>
-            </a:solidFill>
-          </a:ln>
-        </p:spPr>
-        <p:style>
-          <a:lnRef idx="2">
-            <a:schemeClr val="dk1"/>
-          </a:lnRef>
-          <a:fillRef idx="1">
-            <a:schemeClr val="lt1"/>
-          </a:fillRef>
-          <a:effectRef idx="0">
-            <a:schemeClr val="dk1"/>
-          </a:effectRef>
-          <a:fontRef idx="minor">
-            <a:schemeClr val="dk1"/>
-          </a:fontRef>
-        </p:style>
-        <p:txBody>
-          <a:bodyPr lIns="91436" tIns="45718" rIns="91436" bIns="45718" rtlCol="0" anchor="ctr"/>
-          <a:lstStyle/>
-          <a:p>
-            <a:pPr algn="ctr"/>
-            <a:r>
-              <a:rPr lang="en-US" sz="1800" dirty="0">
-                <a:latin typeface="CMU Serif" panose="02000603000000000000" pitchFamily="2" charset="0"/>
-                <a:ea typeface="CMU Serif" panose="02000603000000000000" pitchFamily="2" charset="0"/>
-                <a:cs typeface="CMU Serif" panose="02000603000000000000" pitchFamily="2" charset="0"/>
-              </a:rPr>
-              <a:t>Historical data</a:t>
-            </a:r>
-          </a:p>
-        </p:txBody>
-      </p:sp>
-      <p:sp>
-        <p:nvSpPr>
-          <p:cNvPr id="73" name="Oval 72"/>
-          <p:cNvSpPr/>
-          <p:nvPr/>
-        </p:nvSpPr>
-        <p:spPr>
-          <a:xfrm>
-            <a:off x="3568346" y="1713230"/>
+            <a:off x="4895555" y="2171453"/>
             <a:ext cx="2304256" cy="1152128"/>
           </a:xfrm>
           <a:prstGeom prst="ellipse">
             <a:avLst/>
           </a:prstGeom>
           <a:solidFill>
-            <a:schemeClr val="accent1">
-              <a:lumMod val="60000"/>
-              <a:lumOff val="40000"/>
-            </a:schemeClr>
+            <a:srgbClr val="67A3EB"/>
           </a:solidFill>
-          <a:ln>
+          <a:ln w="19050">
             <a:solidFill>
-              <a:schemeClr val="tx2">
-                <a:lumMod val="60000"/>
-                <a:lumOff val="40000"/>
-              </a:schemeClr>
+              <a:schemeClr val="tx1"/>
             </a:solidFill>
           </a:ln>
         </p:spPr>
@@ -7142,7 +7133,7 @@
           <a:p>
             <a:pPr algn="ctr"/>
             <a:r>
-              <a:rPr lang="en-US" sz="1800" dirty="0">
+              <a:rPr lang="en-US" sz="2000" dirty="0">
                 <a:solidFill>
                   <a:schemeClr val="tx1"/>
                 </a:solidFill>
@@ -7150,51 +7141,31 @@
                 <a:ea typeface="CMU Serif" panose="02000603000000000000" pitchFamily="2" charset="0"/>
                 <a:cs typeface="CMU Serif" panose="02000603000000000000" pitchFamily="2" charset="0"/>
               </a:rPr>
-              <a:t>Data mining and</a:t>
-            </a:r>
-          </a:p>
-          <a:p>
-            <a:pPr algn="ctr"/>
-            <a:r>
-              <a:rPr lang="en-US" sz="1800" dirty="0">
-                <a:solidFill>
-                  <a:schemeClr val="tx1"/>
-                </a:solidFill>
-                <a:latin typeface="CMU Serif" panose="02000603000000000000" pitchFamily="2" charset="0"/>
-                <a:ea typeface="CMU Serif" panose="02000603000000000000" pitchFamily="2" charset="0"/>
-                <a:cs typeface="CMU Serif" panose="02000603000000000000" pitchFamily="2" charset="0"/>
-              </a:rPr>
-              <a:t>understanding</a:t>
+              <a:t>Machine learning</a:t>
             </a:r>
           </a:p>
         </p:txBody>
       </p:sp>
       <p:sp>
         <p:nvSpPr>
-          <p:cNvPr id="74" name="Oval 73"/>
+          <p:cNvPr id="179" name="Oval 178"/>
           <p:cNvSpPr/>
           <p:nvPr/>
         </p:nvSpPr>
         <p:spPr>
           <a:xfrm>
-            <a:off x="3582626" y="4110209"/>
+            <a:off x="8444080" y="2171453"/>
             <a:ext cx="2304256" cy="1152128"/>
           </a:xfrm>
           <a:prstGeom prst="ellipse">
             <a:avLst/>
           </a:prstGeom>
           <a:solidFill>
-            <a:schemeClr val="accent1">
-              <a:lumMod val="60000"/>
-              <a:lumOff val="40000"/>
-            </a:schemeClr>
+            <a:srgbClr val="67A3EB"/>
           </a:solidFill>
-          <a:ln>
+          <a:ln w="19050">
             <a:solidFill>
-              <a:schemeClr val="tx2">
-                <a:lumMod val="60000"/>
-                <a:lumOff val="40000"/>
-              </a:schemeClr>
+              <a:schemeClr val="tx1"/>
             </a:solidFill>
           </a:ln>
         </p:spPr>
@@ -7220,7 +7191,7 @@
           <a:p>
             <a:pPr algn="ctr"/>
             <a:r>
-              <a:rPr lang="en-US" sz="1800" dirty="0">
+              <a:rPr lang="en-US" sz="2000" dirty="0" smtClean="0">
                 <a:solidFill>
                   <a:schemeClr val="tx1"/>
                 </a:solidFill>
@@ -7228,37 +7199,39 @@
                 <a:ea typeface="CMU Serif" panose="02000603000000000000" pitchFamily="2" charset="0"/>
                 <a:cs typeface="CMU Serif" panose="02000603000000000000" pitchFamily="2" charset="0"/>
               </a:rPr>
-              <a:t>Machine learning</a:t>
+              <a:t>Prediction</a:t>
             </a:r>
+            <a:endParaRPr lang="en-US" sz="2000" dirty="0">
+              <a:solidFill>
+                <a:schemeClr val="tx1"/>
+              </a:solidFill>
+              <a:latin typeface="CMU Serif" panose="02000603000000000000" pitchFamily="2" charset="0"/>
+              <a:ea typeface="CMU Serif" panose="02000603000000000000" pitchFamily="2" charset="0"/>
+              <a:cs typeface="CMU Serif" panose="02000603000000000000" pitchFamily="2" charset="0"/>
+            </a:endParaRPr>
           </a:p>
         </p:txBody>
       </p:sp>
       <p:sp>
         <p:nvSpPr>
-          <p:cNvPr id="75" name="Down Arrow 74"/>
+          <p:cNvPr id="180" name="Oval 179"/>
           <p:cNvSpPr/>
           <p:nvPr/>
         </p:nvSpPr>
         <p:spPr>
           <a:xfrm>
-            <a:off x="4518728" y="5510093"/>
-            <a:ext cx="432048" cy="749339"/>
+            <a:off x="8444079" y="26888"/>
+            <a:ext cx="2304256" cy="1152128"/>
           </a:xfrm>
-          <a:prstGeom prst="downArrow">
+          <a:prstGeom prst="ellipse">
             <a:avLst/>
           </a:prstGeom>
           <a:solidFill>
-            <a:schemeClr val="accent1">
-              <a:lumMod val="60000"/>
-              <a:lumOff val="40000"/>
-            </a:schemeClr>
+            <a:srgbClr val="67A3EB"/>
           </a:solidFill>
-          <a:ln>
+          <a:ln w="19050">
             <a:solidFill>
-              <a:schemeClr val="tx2">
-                <a:lumMod val="60000"/>
-                <a:lumOff val="40000"/>
-              </a:schemeClr>
+              <a:schemeClr val="tx1"/>
             </a:solidFill>
           </a:ln>
         </p:spPr>
@@ -7283,7 +7256,21 @@
           <a:lstStyle/>
           <a:p>
             <a:pPr algn="ctr"/>
-            <a:endParaRPr lang="en-US" sz="1800">
+            <a:r>
+              <a:rPr lang="en-US" sz="2000" dirty="0" smtClean="0">
+                <a:solidFill>
+                  <a:schemeClr val="tx1"/>
+                </a:solidFill>
+                <a:latin typeface="CMU Serif" panose="02000603000000000000" pitchFamily="2" charset="0"/>
+                <a:ea typeface="CMU Serif" panose="02000603000000000000" pitchFamily="2" charset="0"/>
+                <a:cs typeface="CMU Serif" panose="02000603000000000000" pitchFamily="2" charset="0"/>
+              </a:rPr>
+              <a:t>Retention campaign</a:t>
+            </a:r>
+            <a:endParaRPr lang="en-US" sz="2000" dirty="0">
+              <a:solidFill>
+                <a:schemeClr val="tx1"/>
+              </a:solidFill>
               <a:latin typeface="CMU Serif" panose="02000603000000000000" pitchFamily="2" charset="0"/>
               <a:ea typeface="CMU Serif" panose="02000603000000000000" pitchFamily="2" charset="0"/>
               <a:cs typeface="CMU Serif" panose="02000603000000000000" pitchFamily="2" charset="0"/>
@@ -7293,30 +7280,24 @@
       </p:sp>
       <p:sp>
         <p:nvSpPr>
-          <p:cNvPr id="76" name="Oval 75"/>
+          <p:cNvPr id="181" name="Right Arrow 180"/>
           <p:cNvSpPr/>
           <p:nvPr/>
         </p:nvSpPr>
         <p:spPr>
-          <a:xfrm>
-            <a:off x="3582626" y="6507185"/>
-            <a:ext cx="2304256" cy="1152128"/>
+          <a:xfrm rot="5400000" flipH="1">
+            <a:off x="9273976" y="1417425"/>
+            <a:ext cx="644463" cy="432048"/>
           </a:xfrm>
-          <a:prstGeom prst="ellipse">
+          <a:prstGeom prst="rightArrow">
             <a:avLst/>
           </a:prstGeom>
           <a:solidFill>
-            <a:schemeClr val="accent1">
-              <a:lumMod val="60000"/>
-              <a:lumOff val="40000"/>
-            </a:schemeClr>
+            <a:srgbClr val="67A3EB"/>
           </a:solidFill>
-          <a:ln>
+          <a:ln w="19050">
             <a:solidFill>
-              <a:schemeClr val="tx2">
-                <a:lumMod val="60000"/>
-                <a:lumOff val="40000"/>
-              </a:schemeClr>
+              <a:schemeClr val="tx1"/>
             </a:solidFill>
           </a:ln>
         </p:spPr>
@@ -7341,46 +7322,669 @@
           <a:lstStyle/>
           <a:p>
             <a:pPr algn="ctr"/>
-            <a:r>
-              <a:rPr lang="en-US" sz="1800" dirty="0">
-                <a:solidFill>
-                  <a:schemeClr val="tx1"/>
-                </a:solidFill>
+            <a:endParaRPr lang="en-US" sz="2000">
+              <a:latin typeface="CMU Serif" panose="02000603000000000000" pitchFamily="2" charset="0"/>
+              <a:ea typeface="CMU Serif" panose="02000603000000000000" pitchFamily="2" charset="0"/>
+              <a:cs typeface="CMU Serif" panose="02000603000000000000" pitchFamily="2" charset="0"/>
+            </a:endParaRPr>
+          </a:p>
+        </p:txBody>
+      </p:sp>
+      <p:grpSp>
+        <p:nvGrpSpPr>
+          <p:cNvPr id="182" name="Group 181"/>
+          <p:cNvGrpSpPr/>
+          <p:nvPr/>
+        </p:nvGrpSpPr>
+        <p:grpSpPr>
+          <a:xfrm>
+            <a:off x="8682" y="4479891"/>
+            <a:ext cx="2053507" cy="1609857"/>
+            <a:chOff x="2381724" y="3020653"/>
+            <a:chExt cx="2053507" cy="1609857"/>
+          </a:xfrm>
+        </p:grpSpPr>
+        <p:pic>
+          <p:nvPicPr>
+            <p:cNvPr id="183" name="Picture 2" descr="C:\Users\tverhels\Documents\others\age.png"/>
+            <p:cNvPicPr>
+              <a:picLocks noChangeAspect="1" noChangeArrowheads="1"/>
+            </p:cNvPicPr>
+            <p:nvPr/>
+          </p:nvPicPr>
+          <p:blipFill>
+            <a:blip r:embed="rId2" cstate="print">
+              <a:extLst>
+                <a:ext uri="{28A0092B-C50C-407E-A947-70E740481C1C}">
+                  <a14:useLocalDpi xmlns:a14="http://schemas.microsoft.com/office/drawing/2010/main" val="0"/>
+                </a:ext>
+              </a:extLst>
+            </a:blip>
+            <a:srcRect/>
+            <a:stretch>
+              <a:fillRect/>
+            </a:stretch>
+          </p:blipFill>
+          <p:spPr bwMode="auto">
+            <a:xfrm>
+              <a:off x="2395029" y="3379996"/>
+              <a:ext cx="2037118" cy="1250514"/>
+            </a:xfrm>
+            <a:prstGeom prst="rect">
+              <a:avLst/>
+            </a:prstGeom>
+            <a:noFill/>
+            <a:extLst>
+              <a:ext uri="{909E8E84-426E-40DD-AFC4-6F175D3DCCD1}">
+                <a14:hiddenFill xmlns:a14="http://schemas.microsoft.com/office/drawing/2010/main">
+                  <a:solidFill>
+                    <a:srgbClr val="FFFFFF"/>
+                  </a:solidFill>
+                </a14:hiddenFill>
+              </a:ext>
+            </a:extLst>
+          </p:spPr>
+        </p:pic>
+        <p:sp>
+          <p:nvSpPr>
+            <p:cNvPr id="184" name="Rectangle 183"/>
+            <p:cNvSpPr/>
+            <p:nvPr/>
+          </p:nvSpPr>
+          <p:spPr>
+            <a:xfrm>
+              <a:off x="2395031" y="3389990"/>
+              <a:ext cx="2036419" cy="1221241"/>
+            </a:xfrm>
+            <a:prstGeom prst="rect">
+              <a:avLst/>
+            </a:prstGeom>
+            <a:noFill/>
+            <a:ln w="19050">
+              <a:solidFill>
+                <a:schemeClr val="tx1"/>
+              </a:solidFill>
+            </a:ln>
+          </p:spPr>
+          <p:style>
+            <a:lnRef idx="2">
+              <a:schemeClr val="accent1">
+                <a:shade val="50000"/>
+              </a:schemeClr>
+            </a:lnRef>
+            <a:fillRef idx="1">
+              <a:schemeClr val="accent1"/>
+            </a:fillRef>
+            <a:effectRef idx="0">
+              <a:schemeClr val="accent1"/>
+            </a:effectRef>
+            <a:fontRef idx="minor">
+              <a:schemeClr val="lt1"/>
+            </a:fontRef>
+          </p:style>
+          <p:txBody>
+            <a:bodyPr lIns="91436" tIns="45718" rIns="91436" bIns="45718" rtlCol="0" anchor="ctr"/>
+            <a:lstStyle/>
+            <a:p>
+              <a:pPr algn="ctr"/>
+              <a:endParaRPr lang="en-US" sz="2000">
                 <a:latin typeface="CMU Serif" panose="02000603000000000000" pitchFamily="2" charset="0"/>
                 <a:ea typeface="CMU Serif" panose="02000603000000000000" pitchFamily="2" charset="0"/>
                 <a:cs typeface="CMU Serif" panose="02000603000000000000" pitchFamily="2" charset="0"/>
-              </a:rPr>
-              <a:t>Predictions</a:t>
-            </a:r>
-          </a:p>
-        </p:txBody>
-      </p:sp>
+              </a:endParaRPr>
+            </a:p>
+          </p:txBody>
+        </p:sp>
+        <p:sp>
+          <p:nvSpPr>
+            <p:cNvPr id="185" name="TextBox 184"/>
+            <p:cNvSpPr txBox="1"/>
+            <p:nvPr/>
+          </p:nvSpPr>
+          <p:spPr>
+            <a:xfrm>
+              <a:off x="2381724" y="3020653"/>
+              <a:ext cx="2053507" cy="400105"/>
+            </a:xfrm>
+            <a:prstGeom prst="rect">
+              <a:avLst/>
+            </a:prstGeom>
+            <a:noFill/>
+          </p:spPr>
+          <p:txBody>
+            <a:bodyPr wrap="square" lIns="91436" tIns="45718" rIns="91436" bIns="45718" rtlCol="0">
+              <a:spAutoFit/>
+            </a:bodyPr>
+            <a:lstStyle/>
+            <a:p>
+              <a:pPr algn="ctr"/>
+              <a:r>
+                <a:rPr lang="en-US" sz="2000" dirty="0">
+                  <a:latin typeface="CMU Serif" panose="02000603000000000000" pitchFamily="2" charset="0"/>
+                  <a:ea typeface="CMU Serif" panose="02000603000000000000" pitchFamily="2" charset="0"/>
+                  <a:cs typeface="CMU Serif" panose="02000603000000000000" pitchFamily="2" charset="0"/>
+                </a:rPr>
+                <a:t>Visualization</a:t>
+              </a:r>
+            </a:p>
+          </p:txBody>
+        </p:sp>
+      </p:grpSp>
+      <p:grpSp>
+        <p:nvGrpSpPr>
+          <p:cNvPr id="186" name="Group 185"/>
+          <p:cNvGrpSpPr/>
+          <p:nvPr/>
+        </p:nvGrpSpPr>
+        <p:grpSpPr>
+          <a:xfrm>
+            <a:off x="2397772" y="4509789"/>
+            <a:ext cx="2427401" cy="1550060"/>
+            <a:chOff x="2217237" y="5423592"/>
+            <a:chExt cx="2427401" cy="1550060"/>
+          </a:xfrm>
+        </p:grpSpPr>
+        <p:pic>
+          <p:nvPicPr>
+            <p:cNvPr id="187" name="Picture 5" descr="C:\Users\tverhels\Documents\others\precision_simo.png"/>
+            <p:cNvPicPr>
+              <a:picLocks noChangeAspect="1" noChangeArrowheads="1"/>
+            </p:cNvPicPr>
+            <p:nvPr/>
+          </p:nvPicPr>
+          <p:blipFill>
+            <a:blip r:embed="rId3" cstate="print">
+              <a:extLst>
+                <a:ext uri="{28A0092B-C50C-407E-A947-70E740481C1C}">
+                  <a14:useLocalDpi xmlns:a14="http://schemas.microsoft.com/office/drawing/2010/main" val="0"/>
+                </a:ext>
+              </a:extLst>
+            </a:blip>
+            <a:srcRect/>
+            <a:stretch>
+              <a:fillRect/>
+            </a:stretch>
+          </p:blipFill>
+          <p:spPr bwMode="auto">
+            <a:xfrm>
+              <a:off x="2425024" y="5911756"/>
+              <a:ext cx="2028967" cy="1019795"/>
+            </a:xfrm>
+            <a:prstGeom prst="rect">
+              <a:avLst/>
+            </a:prstGeom>
+            <a:noFill/>
+            <a:extLst>
+              <a:ext uri="{909E8E84-426E-40DD-AFC4-6F175D3DCCD1}">
+                <a14:hiddenFill xmlns:a14="http://schemas.microsoft.com/office/drawing/2010/main">
+                  <a:solidFill>
+                    <a:srgbClr val="FFFFFF"/>
+                  </a:solidFill>
+                </a14:hiddenFill>
+              </a:ext>
+            </a:extLst>
+          </p:spPr>
+        </p:pic>
+        <p:sp>
+          <p:nvSpPr>
+            <p:cNvPr id="188" name="Rectangle 187"/>
+            <p:cNvSpPr/>
+            <p:nvPr/>
+          </p:nvSpPr>
+          <p:spPr>
+            <a:xfrm>
+              <a:off x="2415095" y="5838031"/>
+              <a:ext cx="2036049" cy="1135621"/>
+            </a:xfrm>
+            <a:prstGeom prst="rect">
+              <a:avLst/>
+            </a:prstGeom>
+            <a:noFill/>
+            <a:ln w="19050">
+              <a:solidFill>
+                <a:schemeClr val="tx1"/>
+              </a:solidFill>
+            </a:ln>
+          </p:spPr>
+          <p:style>
+            <a:lnRef idx="2">
+              <a:schemeClr val="accent1">
+                <a:shade val="50000"/>
+              </a:schemeClr>
+            </a:lnRef>
+            <a:fillRef idx="1">
+              <a:schemeClr val="accent1"/>
+            </a:fillRef>
+            <a:effectRef idx="0">
+              <a:schemeClr val="accent1"/>
+            </a:effectRef>
+            <a:fontRef idx="minor">
+              <a:schemeClr val="lt1"/>
+            </a:fontRef>
+          </p:style>
+          <p:txBody>
+            <a:bodyPr lIns="91436" tIns="45718" rIns="91436" bIns="45718" rtlCol="0" anchor="ctr"/>
+            <a:lstStyle/>
+            <a:p>
+              <a:pPr algn="ctr"/>
+              <a:endParaRPr lang="en-US" sz="2000">
+                <a:latin typeface="CMU Serif" panose="02000603000000000000" pitchFamily="2" charset="0"/>
+                <a:ea typeface="CMU Serif" panose="02000603000000000000" pitchFamily="2" charset="0"/>
+                <a:cs typeface="CMU Serif" panose="02000603000000000000" pitchFamily="2" charset="0"/>
+              </a:endParaRPr>
+            </a:p>
+          </p:txBody>
+        </p:sp>
+        <p:sp>
+          <p:nvSpPr>
+            <p:cNvPr id="189" name="TextBox 188"/>
+            <p:cNvSpPr txBox="1"/>
+            <p:nvPr/>
+          </p:nvSpPr>
+          <p:spPr>
+            <a:xfrm>
+              <a:off x="2217237" y="5423592"/>
+              <a:ext cx="2427401" cy="400105"/>
+            </a:xfrm>
+            <a:prstGeom prst="rect">
+              <a:avLst/>
+            </a:prstGeom>
+            <a:noFill/>
+          </p:spPr>
+          <p:txBody>
+            <a:bodyPr wrap="square" lIns="91436" tIns="45718" rIns="91436" bIns="45718" rtlCol="0">
+              <a:spAutoFit/>
+            </a:bodyPr>
+            <a:lstStyle/>
+            <a:p>
+              <a:pPr algn="ctr"/>
+              <a:r>
+                <a:rPr lang="en-US" sz="2000" dirty="0">
+                  <a:latin typeface="CMU Serif" panose="02000603000000000000" pitchFamily="2" charset="0"/>
+                  <a:ea typeface="CMU Serif" panose="02000603000000000000" pitchFamily="2" charset="0"/>
+                  <a:cs typeface="CMU Serif" panose="02000603000000000000" pitchFamily="2" charset="0"/>
+                </a:rPr>
+                <a:t>Model evaluation</a:t>
+              </a:r>
+            </a:p>
+          </p:txBody>
+        </p:sp>
+      </p:grpSp>
+      <p:grpSp>
+        <p:nvGrpSpPr>
+          <p:cNvPr id="190" name="Group 189"/>
+          <p:cNvGrpSpPr/>
+          <p:nvPr/>
+        </p:nvGrpSpPr>
+        <p:grpSpPr>
+          <a:xfrm>
+            <a:off x="7307525" y="4633145"/>
+            <a:ext cx="2664296" cy="1303348"/>
+            <a:chOff x="2112361" y="8795775"/>
+            <a:chExt cx="2664296" cy="1303348"/>
+          </a:xfrm>
+        </p:grpSpPr>
+        <p:pic>
+          <p:nvPicPr>
+            <p:cNvPr id="191" name="Picture 4"/>
+            <p:cNvPicPr>
+              <a:picLocks noChangeAspect="1" noChangeArrowheads="1"/>
+            </p:cNvPicPr>
+            <p:nvPr/>
+          </p:nvPicPr>
+          <p:blipFill>
+            <a:blip r:embed="rId4" cstate="print">
+              <a:extLst>
+                <a:ext uri="{28A0092B-C50C-407E-A947-70E740481C1C}">
+                  <a14:useLocalDpi xmlns:a14="http://schemas.microsoft.com/office/drawing/2010/main" val="0"/>
+                </a:ext>
+              </a:extLst>
+            </a:blip>
+            <a:stretch>
+              <a:fillRect/>
+            </a:stretch>
+          </p:blipFill>
+          <p:spPr bwMode="auto">
+            <a:xfrm>
+              <a:off x="2456686" y="9207875"/>
+              <a:ext cx="1987178" cy="891218"/>
+            </a:xfrm>
+            <a:prstGeom prst="rect">
+              <a:avLst/>
+            </a:prstGeom>
+            <a:noFill/>
+            <a:extLst>
+              <a:ext uri="{909E8E84-426E-40DD-AFC4-6F175D3DCCD1}">
+                <a14:hiddenFill xmlns:a14="http://schemas.microsoft.com/office/drawing/2010/main">
+                  <a:solidFill>
+                    <a:srgbClr val="FFFFFF"/>
+                  </a:solidFill>
+                </a14:hiddenFill>
+              </a:ext>
+            </a:extLst>
+          </p:spPr>
+        </p:pic>
+        <p:sp>
+          <p:nvSpPr>
+            <p:cNvPr id="192" name="Rectangle 191"/>
+            <p:cNvSpPr/>
+            <p:nvPr/>
+          </p:nvSpPr>
+          <p:spPr>
+            <a:xfrm>
+              <a:off x="2393645" y="9165112"/>
+              <a:ext cx="2074586" cy="934011"/>
+            </a:xfrm>
+            <a:prstGeom prst="rect">
+              <a:avLst/>
+            </a:prstGeom>
+            <a:noFill/>
+            <a:ln w="19050">
+              <a:solidFill>
+                <a:schemeClr val="tx1"/>
+              </a:solidFill>
+            </a:ln>
+          </p:spPr>
+          <p:style>
+            <a:lnRef idx="2">
+              <a:schemeClr val="accent1">
+                <a:shade val="50000"/>
+              </a:schemeClr>
+            </a:lnRef>
+            <a:fillRef idx="1">
+              <a:schemeClr val="accent1"/>
+            </a:fillRef>
+            <a:effectRef idx="0">
+              <a:schemeClr val="accent1"/>
+            </a:effectRef>
+            <a:fontRef idx="minor">
+              <a:schemeClr val="lt1"/>
+            </a:fontRef>
+          </p:style>
+          <p:txBody>
+            <a:bodyPr lIns="91436" tIns="45718" rIns="91436" bIns="45718" rtlCol="0" anchor="ctr"/>
+            <a:lstStyle/>
+            <a:p>
+              <a:pPr algn="ctr"/>
+              <a:endParaRPr lang="en-US" sz="2000">
+                <a:latin typeface="CMU Serif" panose="02000603000000000000" pitchFamily="2" charset="0"/>
+                <a:ea typeface="CMU Serif" panose="02000603000000000000" pitchFamily="2" charset="0"/>
+                <a:cs typeface="CMU Serif" panose="02000603000000000000" pitchFamily="2" charset="0"/>
+              </a:endParaRPr>
+            </a:p>
+          </p:txBody>
+        </p:sp>
+        <p:sp>
+          <p:nvSpPr>
+            <p:cNvPr id="193" name="TextBox 192"/>
+            <p:cNvSpPr txBox="1"/>
+            <p:nvPr/>
+          </p:nvSpPr>
+          <p:spPr>
+            <a:xfrm>
+              <a:off x="2112361" y="8795775"/>
+              <a:ext cx="2664296" cy="400105"/>
+            </a:xfrm>
+            <a:prstGeom prst="rect">
+              <a:avLst/>
+            </a:prstGeom>
+            <a:noFill/>
+            <a:ln w="0">
+              <a:noFill/>
+            </a:ln>
+            <a:effectLst/>
+          </p:spPr>
+          <p:txBody>
+            <a:bodyPr wrap="square" lIns="91436" tIns="45718" rIns="91436" bIns="45718" rtlCol="0">
+              <a:spAutoFit/>
+            </a:bodyPr>
+            <a:lstStyle/>
+            <a:p>
+              <a:pPr algn="ctr"/>
+              <a:r>
+                <a:rPr lang="en-US" sz="2000" dirty="0">
+                  <a:latin typeface="CMU Serif" panose="02000603000000000000" pitchFamily="2" charset="0"/>
+                  <a:ea typeface="CMU Serif" panose="02000603000000000000" pitchFamily="2" charset="0"/>
+                  <a:cs typeface="CMU Serif" panose="02000603000000000000" pitchFamily="2" charset="0"/>
+                </a:rPr>
+                <a:t>Feature selection</a:t>
+              </a:r>
+            </a:p>
+          </p:txBody>
+        </p:sp>
+      </p:grpSp>
+      <p:grpSp>
+        <p:nvGrpSpPr>
+          <p:cNvPr id="194" name="Group 193"/>
+          <p:cNvGrpSpPr/>
+          <p:nvPr/>
+        </p:nvGrpSpPr>
+        <p:grpSpPr>
+          <a:xfrm>
+            <a:off x="4907714" y="4463619"/>
+            <a:ext cx="2317270" cy="1642400"/>
+            <a:chOff x="2256285" y="6980860"/>
+            <a:chExt cx="2317270" cy="1642400"/>
+          </a:xfrm>
+        </p:grpSpPr>
+        <p:sp>
+          <p:nvSpPr>
+            <p:cNvPr id="195" name="Rectangle 194"/>
+            <p:cNvSpPr/>
+            <p:nvPr/>
+          </p:nvSpPr>
+          <p:spPr>
+            <a:xfrm>
+              <a:off x="2381937" y="7372746"/>
+              <a:ext cx="2037118" cy="1250514"/>
+            </a:xfrm>
+            <a:prstGeom prst="rect">
+              <a:avLst/>
+            </a:prstGeom>
+            <a:noFill/>
+            <a:ln w="19050">
+              <a:solidFill>
+                <a:schemeClr val="tx1"/>
+              </a:solidFill>
+            </a:ln>
+          </p:spPr>
+          <p:style>
+            <a:lnRef idx="2">
+              <a:schemeClr val="accent1">
+                <a:shade val="50000"/>
+              </a:schemeClr>
+            </a:lnRef>
+            <a:fillRef idx="1">
+              <a:schemeClr val="accent1"/>
+            </a:fillRef>
+            <a:effectRef idx="0">
+              <a:schemeClr val="accent1"/>
+            </a:effectRef>
+            <a:fontRef idx="minor">
+              <a:schemeClr val="lt1"/>
+            </a:fontRef>
+          </p:style>
+          <p:txBody>
+            <a:bodyPr lIns="91436" tIns="45718" rIns="91436" bIns="45718" rtlCol="0" anchor="ctr"/>
+            <a:lstStyle/>
+            <a:p>
+              <a:pPr algn="ctr"/>
+              <a:endParaRPr lang="en-US" sz="2000">
+                <a:latin typeface="CMU Serif" panose="02000603000000000000" pitchFamily="2" charset="0"/>
+                <a:ea typeface="CMU Serif" panose="02000603000000000000" pitchFamily="2" charset="0"/>
+                <a:cs typeface="CMU Serif" panose="02000603000000000000" pitchFamily="2" charset="0"/>
+              </a:endParaRPr>
+            </a:p>
+          </p:txBody>
+        </p:sp>
+        <p:sp>
+          <p:nvSpPr>
+            <p:cNvPr id="196" name="TextBox 195"/>
+            <p:cNvSpPr txBox="1"/>
+            <p:nvPr/>
+          </p:nvSpPr>
+          <p:spPr>
+            <a:xfrm>
+              <a:off x="2256285" y="6980860"/>
+              <a:ext cx="2317270" cy="400105"/>
+            </a:xfrm>
+            <a:prstGeom prst="rect">
+              <a:avLst/>
+            </a:prstGeom>
+            <a:noFill/>
+          </p:spPr>
+          <p:txBody>
+            <a:bodyPr wrap="square" lIns="91436" tIns="45718" rIns="91436" bIns="45718" rtlCol="0">
+              <a:spAutoFit/>
+            </a:bodyPr>
+            <a:lstStyle/>
+            <a:p>
+              <a:pPr algn="ctr"/>
+              <a:r>
+                <a:rPr lang="en-US" sz="2000" dirty="0">
+                  <a:latin typeface="CMU Serif" panose="02000603000000000000" pitchFamily="2" charset="0"/>
+                  <a:ea typeface="CMU Serif" panose="02000603000000000000" pitchFamily="2" charset="0"/>
+                  <a:cs typeface="CMU Serif" panose="02000603000000000000" pitchFamily="2" charset="0"/>
+                </a:rPr>
+                <a:t>Model selection</a:t>
+              </a:r>
+            </a:p>
+          </p:txBody>
+        </p:sp>
+        <p:graphicFrame>
+          <p:nvGraphicFramePr>
+            <p:cNvPr id="197" name="Diagram 196"/>
+            <p:cNvGraphicFramePr/>
+            <p:nvPr>
+              <p:extLst>
+                <p:ext uri="{D42A27DB-BD31-4B8C-83A1-F6EECF244321}">
+                  <p14:modId xmlns:p14="http://schemas.microsoft.com/office/powerpoint/2010/main" val="1937288073"/>
+                </p:ext>
+              </p:extLst>
+            </p:nvPr>
+          </p:nvGraphicFramePr>
+          <p:xfrm>
+            <a:off x="2433166" y="7425117"/>
+            <a:ext cx="974252" cy="1089875"/>
+          </p:xfrm>
+          <a:graphic>
+            <a:graphicData uri="http://schemas.openxmlformats.org/drawingml/2006/diagram">
+              <dgm:relIds xmlns:dgm="http://schemas.openxmlformats.org/drawingml/2006/diagram" xmlns:r="http://schemas.openxmlformats.org/officeDocument/2006/relationships" r:dm="rId5" r:lo="rId6" r:qs="rId7" r:cs="rId8"/>
+            </a:graphicData>
+          </a:graphic>
+        </p:graphicFrame>
+        <p:pic>
+          <p:nvPicPr>
+            <p:cNvPr id="198" name="Picture 6" descr="C:\Users\tverhels\Documents\others\1_nUpw5agP-Vefm4Uinteq-A.png"/>
+            <p:cNvPicPr>
+              <a:picLocks noChangeAspect="1" noChangeArrowheads="1"/>
+            </p:cNvPicPr>
+            <p:nvPr/>
+          </p:nvPicPr>
+          <p:blipFill>
+            <a:blip r:embed="rId10" cstate="print">
+              <a:extLst>
+                <a:ext uri="{28A0092B-C50C-407E-A947-70E740481C1C}">
+                  <a14:useLocalDpi xmlns:a14="http://schemas.microsoft.com/office/drawing/2010/main" val="0"/>
+                </a:ext>
+              </a:extLst>
+            </a:blip>
+            <a:srcRect/>
+            <a:stretch>
+              <a:fillRect/>
+            </a:stretch>
+          </p:blipFill>
+          <p:spPr bwMode="auto">
+            <a:xfrm>
+              <a:off x="3258047" y="7425117"/>
+              <a:ext cx="1123399" cy="1145768"/>
+            </a:xfrm>
+            <a:prstGeom prst="rect">
+              <a:avLst/>
+            </a:prstGeom>
+            <a:noFill/>
+            <a:extLst>
+              <a:ext uri="{909E8E84-426E-40DD-AFC4-6F175D3DCCD1}">
+                <a14:hiddenFill xmlns:a14="http://schemas.microsoft.com/office/drawing/2010/main">
+                  <a:solidFill>
+                    <a:srgbClr val="FFFFFF"/>
+                  </a:solidFill>
+                </a14:hiddenFill>
+              </a:ext>
+            </a:extLst>
+          </p:spPr>
+        </p:pic>
+      </p:grpSp>
       <p:sp>
         <p:nvSpPr>
-          <p:cNvPr id="77" name="Oval 76"/>
+          <p:cNvPr id="199" name="Can 198"/>
           <p:cNvSpPr/>
           <p:nvPr/>
         </p:nvSpPr>
         <p:spPr>
           <a:xfrm>
-            <a:off x="6939590" y="6507185"/>
-            <a:ext cx="2304256" cy="1152128"/>
+            <a:off x="10892853" y="3950374"/>
+            <a:ext cx="1329130" cy="849522"/>
           </a:xfrm>
-          <a:prstGeom prst="ellipse">
+          <a:prstGeom prst="can">
+            <a:avLst/>
+          </a:prstGeom>
+          <a:ln w="19050">
+            <a:solidFill>
+              <a:schemeClr val="tx1"/>
+            </a:solidFill>
+          </a:ln>
+        </p:spPr>
+        <p:style>
+          <a:lnRef idx="2">
+            <a:schemeClr val="dk1"/>
+          </a:lnRef>
+          <a:fillRef idx="1">
+            <a:schemeClr val="lt1"/>
+          </a:fillRef>
+          <a:effectRef idx="0">
+            <a:schemeClr val="dk1"/>
+          </a:effectRef>
+          <a:fontRef idx="minor">
+            <a:schemeClr val="dk1"/>
+          </a:fontRef>
+        </p:style>
+        <p:txBody>
+          <a:bodyPr lIns="91436" tIns="45718" rIns="91436" bIns="45718" rtlCol="0" anchor="ctr"/>
+          <a:lstStyle/>
+          <a:p>
+            <a:pPr algn="ctr"/>
+            <a:r>
+              <a:rPr lang="en-US" sz="2000" dirty="0">
+                <a:latin typeface="CMU Serif" panose="02000603000000000000" pitchFamily="2" charset="0"/>
+                <a:ea typeface="CMU Serif" panose="02000603000000000000" pitchFamily="2" charset="0"/>
+                <a:cs typeface="CMU Serif" panose="02000603000000000000" pitchFamily="2" charset="0"/>
+              </a:rPr>
+              <a:t>New data</a:t>
+            </a:r>
+          </a:p>
+        </p:txBody>
+      </p:sp>
+      <p:sp>
+        <p:nvSpPr>
+          <p:cNvPr id="200" name="Down Arrow 199"/>
+          <p:cNvSpPr/>
+          <p:nvPr/>
+        </p:nvSpPr>
+        <p:spPr>
+          <a:xfrm rot="16200000">
+            <a:off x="4057397" y="2372846"/>
+            <a:ext cx="432048" cy="749339"/>
+          </a:xfrm>
+          <a:prstGeom prst="downArrow">
             <a:avLst/>
           </a:prstGeom>
           <a:solidFill>
-            <a:schemeClr val="accent1">
-              <a:lumMod val="60000"/>
-              <a:lumOff val="40000"/>
-            </a:schemeClr>
+            <a:srgbClr val="67A3EB"/>
           </a:solidFill>
-          <a:ln>
+          <a:ln w="19050">
             <a:solidFill>
-              <a:schemeClr val="tx2">
-                <a:lumMod val="60000"/>
-                <a:lumOff val="40000"/>
-              </a:schemeClr>
+              <a:schemeClr val="tx1"/>
             </a:solidFill>
           </a:ln>
         </p:spPr>
@@ -7405,51 +8009,39 @@
           <a:lstStyle/>
           <a:p>
             <a:pPr algn="ctr"/>
-            <a:r>
-              <a:rPr lang="en-US" sz="1800" dirty="0">
-                <a:solidFill>
-                  <a:schemeClr val="tx1"/>
-                </a:solidFill>
-                <a:latin typeface="CMU Serif" panose="02000603000000000000" pitchFamily="2" charset="0"/>
-                <a:ea typeface="CMU Serif" panose="02000603000000000000" pitchFamily="2" charset="0"/>
-                <a:cs typeface="CMU Serif" panose="02000603000000000000" pitchFamily="2" charset="0"/>
-              </a:rPr>
-              <a:t>Campaign on target and control group</a:t>
-            </a:r>
+            <a:endParaRPr lang="en-US" sz="2000">
+              <a:latin typeface="CMU Serif" panose="02000603000000000000" pitchFamily="2" charset="0"/>
+              <a:ea typeface="CMU Serif" panose="02000603000000000000" pitchFamily="2" charset="0"/>
+              <a:cs typeface="CMU Serif" panose="02000603000000000000" pitchFamily="2" charset="0"/>
+            </a:endParaRPr>
           </a:p>
         </p:txBody>
       </p:sp>
       <p:sp>
         <p:nvSpPr>
-          <p:cNvPr id="78" name="Bent Arrow 77"/>
+          <p:cNvPr id="201" name="Bent Arrow 200"/>
           <p:cNvSpPr/>
           <p:nvPr/>
         </p:nvSpPr>
         <p:spPr>
-          <a:xfrm flipH="1">
-            <a:off x="6019022" y="248560"/>
-            <a:ext cx="2216710" cy="6120678"/>
+          <a:xfrm rot="16200000" flipH="1" flipV="1">
+            <a:off x="7157958" y="2634903"/>
+            <a:ext cx="629800" cy="2755107"/>
           </a:xfrm>
           <a:prstGeom prst="bentArrow">
             <a:avLst>
-              <a:gd name="adj1" fmla="val 8772"/>
-              <a:gd name="adj2" fmla="val 10623"/>
-              <a:gd name="adj3" fmla="val 16851"/>
-              <a:gd name="adj4" fmla="val 38763"/>
+              <a:gd name="adj1" fmla="val 34137"/>
+              <a:gd name="adj2" fmla="val 34074"/>
+              <a:gd name="adj3" fmla="val 25000"/>
+              <a:gd name="adj4" fmla="val 43750"/>
             </a:avLst>
           </a:prstGeom>
           <a:solidFill>
-            <a:schemeClr val="accent1">
-              <a:lumMod val="60000"/>
-              <a:lumOff val="40000"/>
-            </a:schemeClr>
+            <a:schemeClr val="bg1"/>
           </a:solidFill>
-          <a:ln>
+          <a:ln w="19050">
             <a:solidFill>
-              <a:schemeClr val="tx2">
-                <a:lumMod val="60000"/>
-                <a:lumOff val="40000"/>
-              </a:schemeClr>
+              <a:schemeClr val="tx1"/>
             </a:solidFill>
           </a:ln>
         </p:spPr>
@@ -7474,7 +8066,7 @@
           <a:lstStyle/>
           <a:p>
             <a:pPr algn="ctr"/>
-            <a:endParaRPr lang="en-US" sz="1800">
+            <a:endParaRPr lang="en-US" sz="2000">
               <a:solidFill>
                 <a:schemeClr val="tx1"/>
               </a:solidFill>
@@ -7485,73 +8077,76 @@
           </a:p>
         </p:txBody>
       </p:sp>
-      <p:pic>
-        <p:nvPicPr>
-          <p:cNvPr id="79" name="Picture 2" descr="C:\Users\tverhels\Documents\others\age.png"/>
-          <p:cNvPicPr>
-            <a:picLocks noChangeAspect="1" noChangeArrowheads="1"/>
-          </p:cNvPicPr>
-          <p:nvPr/>
-        </p:nvPicPr>
-        <p:blipFill>
-          <a:blip r:embed="rId2" cstate="print">
-            <a:extLst>
-              <a:ext uri="{28A0092B-C50C-407E-A947-70E740481C1C}">
-                <a14:useLocalDpi xmlns:a14="http://schemas.microsoft.com/office/drawing/2010/main" val="0"/>
-              </a:ext>
-            </a:extLst>
-          </a:blip>
-          <a:srcRect/>
-          <a:stretch>
-            <a:fillRect/>
-          </a:stretch>
-        </p:blipFill>
-        <p:spPr bwMode="auto">
-          <a:xfrm>
-            <a:off x="341878" y="1668683"/>
-            <a:ext cx="2037118" cy="1250514"/>
-          </a:xfrm>
-          <a:prstGeom prst="rect">
-            <a:avLst/>
-          </a:prstGeom>
-          <a:noFill/>
-          <a:extLst>
-            <a:ext uri="{909E8E84-426E-40DD-AFC4-6F175D3DCCD1}">
-              <a14:hiddenFill xmlns:a14="http://schemas.microsoft.com/office/drawing/2010/main">
-                <a:solidFill>
-                  <a:srgbClr val="FFFFFF"/>
-                </a:solidFill>
-              </a14:hiddenFill>
-            </a:ext>
-          </a:extLst>
-        </p:spPr>
-      </p:pic>
       <p:sp>
         <p:nvSpPr>
-          <p:cNvPr id="80" name="Right Arrow 79"/>
+          <p:cNvPr id="202" name="Down Arrow 201"/>
           <p:cNvSpPr/>
           <p:nvPr/>
         </p:nvSpPr>
         <p:spPr>
-          <a:xfrm flipH="1">
-            <a:off x="2577279" y="2073270"/>
-            <a:ext cx="792088" cy="432048"/>
+          <a:xfrm rot="18900000" flipV="1">
+            <a:off x="10545929" y="3282796"/>
+            <a:ext cx="432048" cy="496838"/>
           </a:xfrm>
-          <a:prstGeom prst="rightArrow">
+          <a:prstGeom prst="downArrow">
             <a:avLst/>
           </a:prstGeom>
           <a:solidFill>
-            <a:schemeClr val="accent1">
-              <a:lumMod val="60000"/>
-              <a:lumOff val="40000"/>
-            </a:schemeClr>
+            <a:srgbClr val="67A3EB"/>
           </a:solidFill>
-          <a:ln>
+          <a:ln w="19050">
             <a:solidFill>
-              <a:schemeClr val="tx2">
-                <a:lumMod val="60000"/>
-                <a:lumOff val="40000"/>
-              </a:schemeClr>
+              <a:schemeClr val="tx1"/>
+            </a:solidFill>
+          </a:ln>
+        </p:spPr>
+        <p:style>
+          <a:lnRef idx="2">
+            <a:schemeClr val="dk1"/>
+          </a:lnRef>
+          <a:fillRef idx="1">
+            <a:schemeClr val="lt1"/>
+          </a:fillRef>
+          <a:effectRef idx="0">
+            <a:schemeClr val="dk1"/>
+          </a:effectRef>
+          <a:fontRef idx="minor">
+            <a:schemeClr val="dk1"/>
+          </a:fontRef>
+        </p:style>
+        <p:txBody>
+          <a:bodyPr lIns="91436" tIns="45718" rIns="91436" bIns="45718" rtlCol="0" anchor="ctr"/>
+          <a:lstStyle/>
+          <a:p>
+            <a:pPr algn="ctr"/>
+            <a:endParaRPr lang="en-US" sz="2000">
+              <a:latin typeface="CMU Serif" panose="02000603000000000000" pitchFamily="2" charset="0"/>
+              <a:ea typeface="CMU Serif" panose="02000603000000000000" pitchFamily="2" charset="0"/>
+              <a:cs typeface="CMU Serif" panose="02000603000000000000" pitchFamily="2" charset="0"/>
+            </a:endParaRPr>
+          </a:p>
+        </p:txBody>
+      </p:sp>
+      <p:sp>
+        <p:nvSpPr>
+          <p:cNvPr id="203" name="Down Arrow 202"/>
+          <p:cNvSpPr/>
+          <p:nvPr/>
+        </p:nvSpPr>
+        <p:spPr>
+          <a:xfrm rot="16200000">
+            <a:off x="7605922" y="2372847"/>
+            <a:ext cx="432048" cy="749340"/>
+          </a:xfrm>
+          <a:prstGeom prst="downArrow">
+            <a:avLst/>
+          </a:prstGeom>
+          <a:solidFill>
+            <a:srgbClr val="67A3EB"/>
+          </a:solidFill>
+          <a:ln w="19050">
+            <a:solidFill>
+              <a:schemeClr val="tx1"/>
             </a:solidFill>
           </a:ln>
         </p:spPr>
@@ -7576,7 +8171,7 @@
           <a:lstStyle/>
           <a:p>
             <a:pPr algn="ctr"/>
-            <a:endParaRPr lang="en-US" sz="1800">
+            <a:endParaRPr lang="en-US" sz="2000">
               <a:latin typeface="CMU Serif" panose="02000603000000000000" pitchFamily="2" charset="0"/>
               <a:ea typeface="CMU Serif" panose="02000603000000000000" pitchFamily="2" charset="0"/>
               <a:cs typeface="CMU Serif" panose="02000603000000000000" pitchFamily="2" charset="0"/>
@@ -7586,579 +8181,24 @@
       </p:sp>
       <p:sp>
         <p:nvSpPr>
-          <p:cNvPr id="81" name="Rectangle 80"/>
+          <p:cNvPr id="204" name="Down Arrow 203"/>
           <p:cNvSpPr/>
           <p:nvPr/>
         </p:nvSpPr>
         <p:spPr>
-          <a:xfrm>
-            <a:off x="341880" y="1678677"/>
-            <a:ext cx="2036419" cy="1221241"/>
-          </a:xfrm>
-          <a:prstGeom prst="rect">
-            <a:avLst/>
-          </a:prstGeom>
-          <a:noFill/>
-          <a:ln>
-            <a:solidFill>
-              <a:schemeClr val="tx2">
-                <a:lumMod val="60000"/>
-                <a:lumOff val="40000"/>
-              </a:schemeClr>
-            </a:solidFill>
-          </a:ln>
-        </p:spPr>
-        <p:style>
-          <a:lnRef idx="2">
-            <a:schemeClr val="accent1">
-              <a:shade val="50000"/>
-            </a:schemeClr>
-          </a:lnRef>
-          <a:fillRef idx="1">
-            <a:schemeClr val="accent1"/>
-          </a:fillRef>
-          <a:effectRef idx="0">
-            <a:schemeClr val="accent1"/>
-          </a:effectRef>
-          <a:fontRef idx="minor">
-            <a:schemeClr val="lt1"/>
-          </a:fontRef>
-        </p:style>
-        <p:txBody>
-          <a:bodyPr lIns="91436" tIns="45718" rIns="91436" bIns="45718" rtlCol="0" anchor="ctr"/>
-          <a:lstStyle/>
-          <a:p>
-            <a:pPr algn="ctr"/>
-            <a:endParaRPr lang="en-US" sz="1800">
-              <a:latin typeface="CMU Serif" panose="02000603000000000000" pitchFamily="2" charset="0"/>
-              <a:ea typeface="CMU Serif" panose="02000603000000000000" pitchFamily="2" charset="0"/>
-              <a:cs typeface="CMU Serif" panose="02000603000000000000" pitchFamily="2" charset="0"/>
-            </a:endParaRPr>
-          </a:p>
-        </p:txBody>
-      </p:sp>
-      <p:sp>
-        <p:nvSpPr>
-          <p:cNvPr id="82" name="Rectangle 81"/>
-          <p:cNvSpPr/>
-          <p:nvPr/>
-        </p:nvSpPr>
-        <p:spPr>
-          <a:xfrm>
-            <a:off x="328786" y="5661433"/>
-            <a:ext cx="2037118" cy="1250514"/>
-          </a:xfrm>
-          <a:prstGeom prst="rect">
-            <a:avLst/>
-          </a:prstGeom>
-          <a:noFill/>
-          <a:ln>
-            <a:solidFill>
-              <a:schemeClr val="tx2">
-                <a:lumMod val="60000"/>
-                <a:lumOff val="40000"/>
-              </a:schemeClr>
-            </a:solidFill>
-          </a:ln>
-        </p:spPr>
-        <p:style>
-          <a:lnRef idx="2">
-            <a:schemeClr val="accent1">
-              <a:shade val="50000"/>
-            </a:schemeClr>
-          </a:lnRef>
-          <a:fillRef idx="1">
-            <a:schemeClr val="accent1"/>
-          </a:fillRef>
-          <a:effectRef idx="0">
-            <a:schemeClr val="accent1"/>
-          </a:effectRef>
-          <a:fontRef idx="minor">
-            <a:schemeClr val="lt1"/>
-          </a:fontRef>
-        </p:style>
-        <p:txBody>
-          <a:bodyPr lIns="91436" tIns="45718" rIns="91436" bIns="45718" rtlCol="0" anchor="ctr"/>
-          <a:lstStyle/>
-          <a:p>
-            <a:pPr algn="ctr"/>
-            <a:endParaRPr lang="en-US" sz="1800">
-              <a:latin typeface="CMU Serif" panose="02000603000000000000" pitchFamily="2" charset="0"/>
-              <a:ea typeface="CMU Serif" panose="02000603000000000000" pitchFamily="2" charset="0"/>
-              <a:cs typeface="CMU Serif" panose="02000603000000000000" pitchFamily="2" charset="0"/>
-            </a:endParaRPr>
-          </a:p>
-        </p:txBody>
-      </p:sp>
-      <p:pic>
-        <p:nvPicPr>
-          <p:cNvPr id="83" name="Picture 4"/>
-          <p:cNvPicPr>
-            <a:picLocks noChangeAspect="1" noChangeArrowheads="1"/>
-          </p:cNvPicPr>
-          <p:nvPr/>
-        </p:nvPicPr>
-        <p:blipFill>
-          <a:blip r:embed="rId3" cstate="print">
-            <a:extLst>
-              <a:ext uri="{28A0092B-C50C-407E-A947-70E740481C1C}">
-                <a14:useLocalDpi xmlns:a14="http://schemas.microsoft.com/office/drawing/2010/main" val="0"/>
-              </a:ext>
-            </a:extLst>
-          </a:blip>
-          <a:stretch>
-            <a:fillRect/>
-          </a:stretch>
-        </p:blipFill>
-        <p:spPr bwMode="auto">
-          <a:xfrm>
-            <a:off x="403535" y="7496562"/>
-            <a:ext cx="1987178" cy="891218"/>
-          </a:xfrm>
-          <a:prstGeom prst="rect">
-            <a:avLst/>
-          </a:prstGeom>
-          <a:noFill/>
-          <a:extLst>
-            <a:ext uri="{909E8E84-426E-40DD-AFC4-6F175D3DCCD1}">
-              <a14:hiddenFill xmlns:a14="http://schemas.microsoft.com/office/drawing/2010/main">
-                <a:solidFill>
-                  <a:srgbClr val="FFFFFF"/>
-                </a:solidFill>
-              </a14:hiddenFill>
-            </a:ext>
-          </a:extLst>
-        </p:spPr>
-      </p:pic>
-      <p:pic>
-        <p:nvPicPr>
-          <p:cNvPr id="84" name="Picture 5" descr="C:\Users\tverhels\Documents\others\precision_simo.png"/>
-          <p:cNvPicPr>
-            <a:picLocks noChangeAspect="1" noChangeArrowheads="1"/>
-          </p:cNvPicPr>
-          <p:nvPr/>
-        </p:nvPicPr>
-        <p:blipFill>
-          <a:blip r:embed="rId4" cstate="print">
-            <a:extLst>
-              <a:ext uri="{28A0092B-C50C-407E-A947-70E740481C1C}">
-                <a14:useLocalDpi xmlns:a14="http://schemas.microsoft.com/office/drawing/2010/main" val="0"/>
-              </a:ext>
-            </a:extLst>
-          </a:blip>
-          <a:srcRect/>
-          <a:stretch>
-            <a:fillRect/>
-          </a:stretch>
-        </p:blipFill>
-        <p:spPr bwMode="auto">
-          <a:xfrm>
-            <a:off x="371873" y="4200443"/>
-            <a:ext cx="2028967" cy="1019795"/>
-          </a:xfrm>
-          <a:prstGeom prst="rect">
-            <a:avLst/>
-          </a:prstGeom>
-          <a:noFill/>
-          <a:extLst>
-            <a:ext uri="{909E8E84-426E-40DD-AFC4-6F175D3DCCD1}">
-              <a14:hiddenFill xmlns:a14="http://schemas.microsoft.com/office/drawing/2010/main">
-                <a:solidFill>
-                  <a:srgbClr val="FFFFFF"/>
-                </a:solidFill>
-              </a14:hiddenFill>
-            </a:ext>
-          </a:extLst>
-        </p:spPr>
-      </p:pic>
-      <p:sp>
-        <p:nvSpPr>
-          <p:cNvPr id="85" name="Rectangle 84"/>
-          <p:cNvSpPr/>
-          <p:nvPr/>
-        </p:nvSpPr>
-        <p:spPr>
-          <a:xfrm>
-            <a:off x="340494" y="7453799"/>
-            <a:ext cx="2074586" cy="934011"/>
-          </a:xfrm>
-          <a:prstGeom prst="rect">
-            <a:avLst/>
-          </a:prstGeom>
-          <a:noFill/>
-          <a:ln>
-            <a:solidFill>
-              <a:schemeClr val="tx2">
-                <a:lumMod val="60000"/>
-                <a:lumOff val="40000"/>
-              </a:schemeClr>
-            </a:solidFill>
-          </a:ln>
-        </p:spPr>
-        <p:style>
-          <a:lnRef idx="2">
-            <a:schemeClr val="accent1">
-              <a:shade val="50000"/>
-            </a:schemeClr>
-          </a:lnRef>
-          <a:fillRef idx="1">
-            <a:schemeClr val="accent1"/>
-          </a:fillRef>
-          <a:effectRef idx="0">
-            <a:schemeClr val="accent1"/>
-          </a:effectRef>
-          <a:fontRef idx="minor">
-            <a:schemeClr val="lt1"/>
-          </a:fontRef>
-        </p:style>
-        <p:txBody>
-          <a:bodyPr lIns="91436" tIns="45718" rIns="91436" bIns="45718" rtlCol="0" anchor="ctr"/>
-          <a:lstStyle/>
-          <a:p>
-            <a:pPr algn="ctr"/>
-            <a:endParaRPr lang="en-US" sz="1800">
-              <a:latin typeface="CMU Serif" panose="02000603000000000000" pitchFamily="2" charset="0"/>
-              <a:ea typeface="CMU Serif" panose="02000603000000000000" pitchFamily="2" charset="0"/>
-              <a:cs typeface="CMU Serif" panose="02000603000000000000" pitchFamily="2" charset="0"/>
-            </a:endParaRPr>
-          </a:p>
-        </p:txBody>
-      </p:sp>
-      <p:sp>
-        <p:nvSpPr>
-          <p:cNvPr id="86" name="Rectangle 85"/>
-          <p:cNvSpPr/>
-          <p:nvPr/>
-        </p:nvSpPr>
-        <p:spPr>
-          <a:xfrm>
-            <a:off x="361944" y="4126718"/>
-            <a:ext cx="2036049" cy="1135621"/>
-          </a:xfrm>
-          <a:prstGeom prst="rect">
-            <a:avLst/>
-          </a:prstGeom>
-          <a:noFill/>
-          <a:ln>
-            <a:solidFill>
-              <a:schemeClr val="tx2">
-                <a:lumMod val="60000"/>
-                <a:lumOff val="40000"/>
-              </a:schemeClr>
-            </a:solidFill>
-          </a:ln>
-        </p:spPr>
-        <p:style>
-          <a:lnRef idx="2">
-            <a:schemeClr val="accent1">
-              <a:shade val="50000"/>
-            </a:schemeClr>
-          </a:lnRef>
-          <a:fillRef idx="1">
-            <a:schemeClr val="accent1"/>
-          </a:fillRef>
-          <a:effectRef idx="0">
-            <a:schemeClr val="accent1"/>
-          </a:effectRef>
-          <a:fontRef idx="minor">
-            <a:schemeClr val="lt1"/>
-          </a:fontRef>
-        </p:style>
-        <p:txBody>
-          <a:bodyPr lIns="91436" tIns="45718" rIns="91436" bIns="45718" rtlCol="0" anchor="ctr"/>
-          <a:lstStyle/>
-          <a:p>
-            <a:pPr algn="ctr"/>
-            <a:endParaRPr lang="en-US" sz="1800">
-              <a:latin typeface="CMU Serif" panose="02000603000000000000" pitchFamily="2" charset="0"/>
-              <a:ea typeface="CMU Serif" panose="02000603000000000000" pitchFamily="2" charset="0"/>
-              <a:cs typeface="CMU Serif" panose="02000603000000000000" pitchFamily="2" charset="0"/>
-            </a:endParaRPr>
-          </a:p>
-        </p:txBody>
-      </p:sp>
-      <p:sp>
-        <p:nvSpPr>
-          <p:cNvPr id="87" name="TextBox 86"/>
-          <p:cNvSpPr txBox="1"/>
-          <p:nvPr/>
-        </p:nvSpPr>
-        <p:spPr>
-          <a:xfrm>
-            <a:off x="328573" y="1309340"/>
-            <a:ext cx="2053507" cy="369328"/>
-          </a:xfrm>
-          <a:prstGeom prst="rect">
-            <a:avLst/>
-          </a:prstGeom>
-          <a:noFill/>
-        </p:spPr>
-        <p:txBody>
-          <a:bodyPr wrap="square" lIns="91436" tIns="45718" rIns="91436" bIns="45718" rtlCol="0">
-            <a:spAutoFit/>
-          </a:bodyPr>
-          <a:lstStyle/>
-          <a:p>
-            <a:pPr algn="ctr"/>
-            <a:r>
-              <a:rPr lang="en-US" sz="1800" dirty="0">
-                <a:latin typeface="CMU Serif" panose="02000603000000000000" pitchFamily="2" charset="0"/>
-                <a:ea typeface="CMU Serif" panose="02000603000000000000" pitchFamily="2" charset="0"/>
-                <a:cs typeface="CMU Serif" panose="02000603000000000000" pitchFamily="2" charset="0"/>
-              </a:rPr>
-              <a:t>Visualization</a:t>
-            </a:r>
-          </a:p>
-        </p:txBody>
-      </p:sp>
-      <p:sp>
-        <p:nvSpPr>
-          <p:cNvPr id="88" name="TextBox 87"/>
-          <p:cNvSpPr txBox="1"/>
-          <p:nvPr/>
-        </p:nvSpPr>
-        <p:spPr>
-          <a:xfrm>
-            <a:off x="164086" y="3712279"/>
-            <a:ext cx="2427401" cy="369328"/>
-          </a:xfrm>
-          <a:prstGeom prst="rect">
-            <a:avLst/>
-          </a:prstGeom>
-          <a:noFill/>
-        </p:spPr>
-        <p:txBody>
-          <a:bodyPr wrap="square" lIns="91436" tIns="45718" rIns="91436" bIns="45718" rtlCol="0">
-            <a:spAutoFit/>
-          </a:bodyPr>
-          <a:lstStyle/>
-          <a:p>
-            <a:pPr algn="ctr"/>
-            <a:r>
-              <a:rPr lang="en-US" sz="1800" dirty="0">
-                <a:latin typeface="CMU Serif" panose="02000603000000000000" pitchFamily="2" charset="0"/>
-                <a:ea typeface="CMU Serif" panose="02000603000000000000" pitchFamily="2" charset="0"/>
-                <a:cs typeface="CMU Serif" panose="02000603000000000000" pitchFamily="2" charset="0"/>
-              </a:rPr>
-              <a:t>Model evaluation</a:t>
-            </a:r>
-          </a:p>
-        </p:txBody>
-      </p:sp>
-      <p:sp>
-        <p:nvSpPr>
-          <p:cNvPr id="89" name="TextBox 88"/>
-          <p:cNvSpPr txBox="1"/>
-          <p:nvPr/>
-        </p:nvSpPr>
-        <p:spPr>
-          <a:xfrm>
-            <a:off x="203134" y="5269547"/>
-            <a:ext cx="2317270" cy="369328"/>
-          </a:xfrm>
-          <a:prstGeom prst="rect">
-            <a:avLst/>
-          </a:prstGeom>
-          <a:noFill/>
-        </p:spPr>
-        <p:txBody>
-          <a:bodyPr wrap="square" lIns="91436" tIns="45718" rIns="91436" bIns="45718" rtlCol="0">
-            <a:spAutoFit/>
-          </a:bodyPr>
-          <a:lstStyle/>
-          <a:p>
-            <a:pPr algn="ctr"/>
-            <a:r>
-              <a:rPr lang="en-US" sz="1800" dirty="0">
-                <a:latin typeface="CMU Serif" panose="02000603000000000000" pitchFamily="2" charset="0"/>
-                <a:ea typeface="CMU Serif" panose="02000603000000000000" pitchFamily="2" charset="0"/>
-                <a:cs typeface="CMU Serif" panose="02000603000000000000" pitchFamily="2" charset="0"/>
-              </a:rPr>
-              <a:t>Model selection</a:t>
-            </a:r>
-          </a:p>
-        </p:txBody>
-      </p:sp>
-      <p:sp>
-        <p:nvSpPr>
-          <p:cNvPr id="90" name="TextBox 89"/>
-          <p:cNvSpPr txBox="1"/>
-          <p:nvPr/>
-        </p:nvSpPr>
-        <p:spPr>
-          <a:xfrm>
-            <a:off x="59210" y="7084462"/>
-            <a:ext cx="2664296" cy="369328"/>
-          </a:xfrm>
-          <a:prstGeom prst="rect">
-            <a:avLst/>
-          </a:prstGeom>
-          <a:noFill/>
-          <a:ln w="0">
-            <a:noFill/>
-          </a:ln>
-          <a:effectLst/>
-        </p:spPr>
-        <p:txBody>
-          <a:bodyPr wrap="square" lIns="91436" tIns="45718" rIns="91436" bIns="45718" rtlCol="0">
-            <a:spAutoFit/>
-          </a:bodyPr>
-          <a:lstStyle/>
-          <a:p>
-            <a:pPr algn="ctr"/>
-            <a:r>
-              <a:rPr lang="en-US" sz="1800" dirty="0">
-                <a:latin typeface="CMU Serif" panose="02000603000000000000" pitchFamily="2" charset="0"/>
-                <a:ea typeface="CMU Serif" panose="02000603000000000000" pitchFamily="2" charset="0"/>
-                <a:cs typeface="CMU Serif" panose="02000603000000000000" pitchFamily="2" charset="0"/>
-              </a:rPr>
-              <a:t>Feature selection</a:t>
-            </a:r>
-          </a:p>
-        </p:txBody>
-      </p:sp>
-      <p:graphicFrame>
-        <p:nvGraphicFramePr>
-          <p:cNvPr id="91" name="Diagram 90"/>
-          <p:cNvGraphicFramePr/>
-          <p:nvPr>
-            <p:extLst>
-              <p:ext uri="{D42A27DB-BD31-4B8C-83A1-F6EECF244321}">
-                <p14:modId xmlns:p14="http://schemas.microsoft.com/office/powerpoint/2010/main" val="1213606891"/>
-              </p:ext>
-            </p:extLst>
-          </p:nvPr>
-        </p:nvGraphicFramePr>
-        <p:xfrm>
-          <a:off x="380015" y="5713804"/>
-          <a:ext cx="974252" cy="1089875"/>
-        </p:xfrm>
-        <a:graphic>
-          <a:graphicData uri="http://schemas.openxmlformats.org/drawingml/2006/diagram">
-            <dgm:relIds xmlns:dgm="http://schemas.openxmlformats.org/drawingml/2006/diagram" xmlns:r="http://schemas.openxmlformats.org/officeDocument/2006/relationships" r:dm="rId5" r:lo="rId6" r:qs="rId7" r:cs="rId8"/>
-          </a:graphicData>
-        </a:graphic>
-      </p:graphicFrame>
-      <p:pic>
-        <p:nvPicPr>
-          <p:cNvPr id="92" name="Picture 6" descr="C:\Users\tverhels\Documents\others\1_nUpw5agP-Vefm4Uinteq-A.png"/>
-          <p:cNvPicPr>
-            <a:picLocks noChangeAspect="1" noChangeArrowheads="1"/>
-          </p:cNvPicPr>
-          <p:nvPr/>
-        </p:nvPicPr>
-        <p:blipFill>
-          <a:blip r:embed="rId10" cstate="print">
-            <a:extLst>
-              <a:ext uri="{28A0092B-C50C-407E-A947-70E740481C1C}">
-                <a14:useLocalDpi xmlns:a14="http://schemas.microsoft.com/office/drawing/2010/main" val="0"/>
-              </a:ext>
-            </a:extLst>
-          </a:blip>
-          <a:srcRect/>
-          <a:stretch>
-            <a:fillRect/>
-          </a:stretch>
-        </p:blipFill>
-        <p:spPr bwMode="auto">
-          <a:xfrm>
-            <a:off x="1204896" y="5713804"/>
-            <a:ext cx="1123399" cy="1145768"/>
-          </a:xfrm>
-          <a:prstGeom prst="rect">
-            <a:avLst/>
-          </a:prstGeom>
-          <a:noFill/>
-          <a:extLst>
-            <a:ext uri="{909E8E84-426E-40DD-AFC4-6F175D3DCCD1}">
-              <a14:hiddenFill xmlns:a14="http://schemas.microsoft.com/office/drawing/2010/main">
-                <a:solidFill>
-                  <a:srgbClr val="FFFFFF"/>
-                </a:solidFill>
-              </a14:hiddenFill>
-            </a:ext>
-          </a:extLst>
-        </p:spPr>
-      </p:pic>
-      <p:sp>
-        <p:nvSpPr>
-          <p:cNvPr id="93" name="Can 92"/>
-          <p:cNvSpPr/>
-          <p:nvPr/>
-        </p:nvSpPr>
-        <p:spPr>
-          <a:xfrm>
-            <a:off x="4055909" y="8487685"/>
-            <a:ext cx="1329130" cy="849522"/>
-          </a:xfrm>
-          <a:prstGeom prst="can">
-            <a:avLst/>
-          </a:prstGeom>
-          <a:ln>
-            <a:solidFill>
-              <a:schemeClr val="tx2">
-                <a:lumMod val="60000"/>
-                <a:lumOff val="40000"/>
-              </a:schemeClr>
-            </a:solidFill>
-          </a:ln>
-        </p:spPr>
-        <p:style>
-          <a:lnRef idx="2">
-            <a:schemeClr val="dk1"/>
-          </a:lnRef>
-          <a:fillRef idx="1">
-            <a:schemeClr val="lt1"/>
-          </a:fillRef>
-          <a:effectRef idx="0">
-            <a:schemeClr val="dk1"/>
-          </a:effectRef>
-          <a:fontRef idx="minor">
-            <a:schemeClr val="dk1"/>
-          </a:fontRef>
-        </p:style>
-        <p:txBody>
-          <a:bodyPr lIns="91436" tIns="45718" rIns="91436" bIns="45718" rtlCol="0" anchor="ctr"/>
-          <a:lstStyle/>
-          <a:p>
-            <a:pPr algn="ctr"/>
-            <a:r>
-              <a:rPr lang="en-US" sz="1800" dirty="0">
-                <a:latin typeface="CMU Serif" panose="02000603000000000000" pitchFamily="2" charset="0"/>
-                <a:ea typeface="CMU Serif" panose="02000603000000000000" pitchFamily="2" charset="0"/>
-                <a:cs typeface="CMU Serif" panose="02000603000000000000" pitchFamily="2" charset="0"/>
-              </a:rPr>
-              <a:t>New data</a:t>
-            </a:r>
-          </a:p>
-        </p:txBody>
-      </p:sp>
-      <p:sp>
-        <p:nvSpPr>
-          <p:cNvPr id="94" name="Down Arrow 93"/>
-          <p:cNvSpPr/>
-          <p:nvPr/>
-        </p:nvSpPr>
-        <p:spPr>
-          <a:xfrm>
-            <a:off x="4518728" y="3113115"/>
-            <a:ext cx="432048" cy="749339"/>
+          <a:xfrm rot="5400000">
+            <a:off x="5831659" y="-1410005"/>
+            <a:ext cx="432048" cy="4025915"/>
           </a:xfrm>
           <a:prstGeom prst="downArrow">
             <a:avLst/>
           </a:prstGeom>
           <a:solidFill>
-            <a:schemeClr val="accent1">
-              <a:lumMod val="60000"/>
-              <a:lumOff val="40000"/>
-            </a:schemeClr>
+            <a:srgbClr val="67A3EB"/>
           </a:solidFill>
-          <a:ln>
+          <a:ln w="19050">
             <a:solidFill>
-              <a:schemeClr val="tx2">
-                <a:lumMod val="60000"/>
-                <a:lumOff val="40000"/>
-              </a:schemeClr>
+              <a:schemeClr val="tx1"/>
             </a:solidFill>
           </a:ln>
         </p:spPr>
@@ -8183,7 +8223,7 @@
           <a:lstStyle/>
           <a:p>
             <a:pPr algn="ctr"/>
-            <a:endParaRPr lang="en-US" sz="1800">
+            <a:endParaRPr lang="en-US" sz="2000">
               <a:latin typeface="CMU Serif" panose="02000603000000000000" pitchFamily="2" charset="0"/>
               <a:ea typeface="CMU Serif" panose="02000603000000000000" pitchFamily="2" charset="0"/>
               <a:cs typeface="CMU Serif" panose="02000603000000000000" pitchFamily="2" charset="0"/>
@@ -8193,85 +8233,29 @@
       </p:sp>
       <p:sp>
         <p:nvSpPr>
-          <p:cNvPr id="95" name="Down Arrow 94"/>
-          <p:cNvSpPr/>
-          <p:nvPr/>
-        </p:nvSpPr>
-        <p:spPr>
-          <a:xfrm>
-            <a:off x="4518728" y="1054769"/>
-            <a:ext cx="432048" cy="496838"/>
-          </a:xfrm>
-          <a:prstGeom prst="downArrow">
-            <a:avLst/>
-          </a:prstGeom>
-          <a:ln>
-            <a:solidFill>
-              <a:schemeClr val="tx2">
-                <a:lumMod val="60000"/>
-                <a:lumOff val="40000"/>
-              </a:schemeClr>
-            </a:solidFill>
-          </a:ln>
-        </p:spPr>
-        <p:style>
-          <a:lnRef idx="2">
-            <a:schemeClr val="dk1"/>
-          </a:lnRef>
-          <a:fillRef idx="1">
-            <a:schemeClr val="lt1"/>
-          </a:fillRef>
-          <a:effectRef idx="0">
-            <a:schemeClr val="dk1"/>
-          </a:effectRef>
-          <a:fontRef idx="minor">
-            <a:schemeClr val="dk1"/>
-          </a:fontRef>
-        </p:style>
-        <p:txBody>
-          <a:bodyPr lIns="91436" tIns="45718" rIns="91436" bIns="45718" rtlCol="0" anchor="ctr"/>
-          <a:lstStyle/>
-          <a:p>
-            <a:pPr algn="ctr"/>
-            <a:endParaRPr lang="en-US" sz="1800">
-              <a:latin typeface="CMU Serif" panose="02000603000000000000" pitchFamily="2" charset="0"/>
-              <a:ea typeface="CMU Serif" panose="02000603000000000000" pitchFamily="2" charset="0"/>
-              <a:cs typeface="CMU Serif" panose="02000603000000000000" pitchFamily="2" charset="0"/>
-            </a:endParaRPr>
-          </a:p>
-        </p:txBody>
-      </p:sp>
-      <p:sp>
-        <p:nvSpPr>
-          <p:cNvPr id="96" name="Bent Arrow 95"/>
+          <p:cNvPr id="205" name="Bent Arrow 204"/>
           <p:cNvSpPr/>
           <p:nvPr/>
         </p:nvSpPr>
         <p:spPr>
           <a:xfrm rot="16200000" flipH="1">
-            <a:off x="2440317" y="5127715"/>
-            <a:ext cx="1496222" cy="397668"/>
+            <a:off x="4405172" y="2684847"/>
+            <a:ext cx="629800" cy="2655221"/>
           </a:xfrm>
           <a:prstGeom prst="bentArrow">
             <a:avLst>
-              <a:gd name="adj1" fmla="val 53618"/>
-              <a:gd name="adj2" fmla="val 26809"/>
-              <a:gd name="adj3" fmla="val 50000"/>
-              <a:gd name="adj4" fmla="val 92025"/>
+              <a:gd name="adj1" fmla="val 34137"/>
+              <a:gd name="adj2" fmla="val 34074"/>
+              <a:gd name="adj3" fmla="val 25000"/>
+              <a:gd name="adj4" fmla="val 43750"/>
             </a:avLst>
           </a:prstGeom>
           <a:solidFill>
-            <a:schemeClr val="accent1">
-              <a:lumMod val="60000"/>
-              <a:lumOff val="40000"/>
-            </a:schemeClr>
+            <a:schemeClr val="bg1"/>
           </a:solidFill>
-          <a:ln>
+          <a:ln w="19050">
             <a:solidFill>
-              <a:schemeClr val="tx2">
-                <a:lumMod val="60000"/>
-                <a:lumOff val="40000"/>
-              </a:schemeClr>
+              <a:schemeClr val="tx1"/>
             </a:solidFill>
           </a:ln>
         </p:spPr>
@@ -8296,7 +8280,7 @@
           <a:lstStyle/>
           <a:p>
             <a:pPr algn="ctr"/>
-            <a:endParaRPr lang="en-US">
+            <a:endParaRPr lang="en-US" sz="2000">
               <a:solidFill>
                 <a:schemeClr val="tx1"/>
               </a:solidFill>
@@ -8309,35 +8293,24 @@
       </p:sp>
       <p:sp>
         <p:nvSpPr>
-          <p:cNvPr id="97" name="Bent Arrow 96"/>
+          <p:cNvPr id="206" name="Down Arrow 205"/>
           <p:cNvSpPr/>
           <p:nvPr/>
         </p:nvSpPr>
         <p:spPr>
-          <a:xfrm flipH="1" flipV="1">
-            <a:off x="2577278" y="5638878"/>
-            <a:ext cx="626627" cy="846074"/>
+          <a:xfrm rot="2700000">
+            <a:off x="1544342" y="3441632"/>
+            <a:ext cx="432048" cy="1024784"/>
           </a:xfrm>
-          <a:prstGeom prst="bentArrow">
-            <a:avLst>
-              <a:gd name="adj1" fmla="val 34320"/>
-              <a:gd name="adj2" fmla="val 38024"/>
-              <a:gd name="adj3" fmla="val 32129"/>
-              <a:gd name="adj4" fmla="val 46822"/>
-            </a:avLst>
+          <a:prstGeom prst="downArrow">
+            <a:avLst/>
           </a:prstGeom>
           <a:solidFill>
-            <a:schemeClr val="accent1">
-              <a:lumMod val="60000"/>
-              <a:lumOff val="40000"/>
-            </a:schemeClr>
+            <a:schemeClr val="bg1"/>
           </a:solidFill>
-          <a:ln>
+          <a:ln w="19050">
             <a:solidFill>
-              <a:schemeClr val="tx2">
-                <a:lumMod val="60000"/>
-                <a:lumOff val="40000"/>
-              </a:schemeClr>
+              <a:schemeClr val="tx1"/>
             </a:solidFill>
           </a:ln>
         </p:spPr>
@@ -8362,10 +8335,7 @@
           <a:lstStyle/>
           <a:p>
             <a:pPr algn="ctr"/>
-            <a:endParaRPr lang="en-US">
-              <a:solidFill>
-                <a:schemeClr val="tx1"/>
-              </a:solidFill>
+            <a:endParaRPr lang="en-US" sz="2000">
               <a:latin typeface="CMU Serif" panose="02000603000000000000" pitchFamily="2" charset="0"/>
               <a:ea typeface="CMU Serif" panose="02000603000000000000" pitchFamily="2" charset="0"/>
               <a:cs typeface="CMU Serif" panose="02000603000000000000" pitchFamily="2" charset="0"/>
@@ -8375,35 +8345,24 @@
       </p:sp>
       <p:sp>
         <p:nvSpPr>
-          <p:cNvPr id="98" name="Bent Arrow 97"/>
+          <p:cNvPr id="207" name="Right Arrow 206"/>
           <p:cNvSpPr/>
           <p:nvPr/>
         </p:nvSpPr>
         <p:spPr>
-          <a:xfrm flipH="1" flipV="1">
-            <a:off x="2574104" y="5889728"/>
-            <a:ext cx="629800" cy="2227444"/>
+          <a:xfrm rot="16200000" flipH="1">
+            <a:off x="5627421" y="3673202"/>
+            <a:ext cx="849008" cy="432048"/>
           </a:xfrm>
-          <a:prstGeom prst="bentArrow">
-            <a:avLst>
-              <a:gd name="adj1" fmla="val 34137"/>
-              <a:gd name="adj2" fmla="val 34074"/>
-              <a:gd name="adj3" fmla="val 25000"/>
-              <a:gd name="adj4" fmla="val 43750"/>
-            </a:avLst>
+          <a:prstGeom prst="rightArrow">
+            <a:avLst/>
           </a:prstGeom>
           <a:solidFill>
-            <a:schemeClr val="accent1">
-              <a:lumMod val="60000"/>
-              <a:lumOff val="40000"/>
-            </a:schemeClr>
+            <a:schemeClr val="bg1"/>
           </a:solidFill>
-          <a:ln>
+          <a:ln w="19050">
             <a:solidFill>
-              <a:schemeClr val="tx2">
-                <a:lumMod val="60000"/>
-                <a:lumOff val="40000"/>
-              </a:schemeClr>
+              <a:schemeClr val="tx1"/>
             </a:solidFill>
           </a:ln>
         </p:spPr>
@@ -8428,10 +8387,7 @@
           <a:lstStyle/>
           <a:p>
             <a:pPr algn="ctr"/>
-            <a:endParaRPr lang="en-US">
-              <a:solidFill>
-                <a:schemeClr val="tx1"/>
-              </a:solidFill>
+            <a:endParaRPr lang="en-US" sz="2000">
               <a:latin typeface="CMU Serif" panose="02000603000000000000" pitchFamily="2" charset="0"/>
               <a:ea typeface="CMU Serif" panose="02000603000000000000" pitchFamily="2" charset="0"/>
               <a:cs typeface="CMU Serif" panose="02000603000000000000" pitchFamily="2" charset="0"/>
@@ -8439,82 +8395,96 @@
           </a:p>
         </p:txBody>
       </p:sp>
+      <p:cxnSp>
+        <p:nvCxnSpPr>
+          <p:cNvPr id="208" name="Straight Connector 207"/>
+          <p:cNvCxnSpPr/>
+          <p:nvPr/>
+        </p:nvCxnSpPr>
+        <p:spPr>
+          <a:xfrm flipH="1">
+            <a:off x="5946402" y="3707083"/>
+            <a:ext cx="3" cy="195262"/>
+          </a:xfrm>
+          <a:prstGeom prst="line">
+            <a:avLst/>
+          </a:prstGeom>
+          <a:ln w="38100">
+            <a:solidFill>
+              <a:schemeClr val="bg1"/>
+            </a:solidFill>
+          </a:ln>
+        </p:spPr>
+        <p:style>
+          <a:lnRef idx="1">
+            <a:schemeClr val="accent1"/>
+          </a:lnRef>
+          <a:fillRef idx="0">
+            <a:schemeClr val="accent1"/>
+          </a:fillRef>
+          <a:effectRef idx="0">
+            <a:schemeClr val="accent1"/>
+          </a:effectRef>
+          <a:fontRef idx="minor">
+            <a:schemeClr val="tx1"/>
+          </a:fontRef>
+        </p:style>
+      </p:cxnSp>
+      <p:cxnSp>
+        <p:nvCxnSpPr>
+          <p:cNvPr id="209" name="Straight Connector 208"/>
+          <p:cNvCxnSpPr/>
+          <p:nvPr/>
+        </p:nvCxnSpPr>
+        <p:spPr>
+          <a:xfrm flipH="1">
+            <a:off x="6157222" y="3706006"/>
+            <a:ext cx="1" cy="195262"/>
+          </a:xfrm>
+          <a:prstGeom prst="line">
+            <a:avLst/>
+          </a:prstGeom>
+          <a:ln w="38100">
+            <a:solidFill>
+              <a:schemeClr val="bg1"/>
+            </a:solidFill>
+          </a:ln>
+        </p:spPr>
+        <p:style>
+          <a:lnRef idx="1">
+            <a:schemeClr val="accent1"/>
+          </a:lnRef>
+          <a:fillRef idx="0">
+            <a:schemeClr val="accent1"/>
+          </a:fillRef>
+          <a:effectRef idx="0">
+            <a:schemeClr val="accent1"/>
+          </a:effectRef>
+          <a:fontRef idx="minor">
+            <a:schemeClr val="tx1"/>
+          </a:fontRef>
+        </p:style>
+      </p:cxnSp>
       <p:sp>
         <p:nvSpPr>
-          <p:cNvPr id="99" name="Down Arrow 98"/>
+          <p:cNvPr id="210" name="Right Arrow 209"/>
           <p:cNvSpPr/>
           <p:nvPr/>
         </p:nvSpPr>
         <p:spPr>
-          <a:xfrm flipV="1">
-            <a:off x="4518728" y="7825083"/>
-            <a:ext cx="432048" cy="496838"/>
+          <a:xfrm rot="16200000" flipH="1">
+            <a:off x="2176927" y="1417427"/>
+            <a:ext cx="644463" cy="432048"/>
           </a:xfrm>
-          <a:prstGeom prst="downArrow">
-            <a:avLst/>
-          </a:prstGeom>
-          <a:ln>
-            <a:solidFill>
-              <a:schemeClr val="tx2">
-                <a:lumMod val="60000"/>
-                <a:lumOff val="40000"/>
-              </a:schemeClr>
-            </a:solidFill>
-          </a:ln>
-        </p:spPr>
-        <p:style>
-          <a:lnRef idx="2">
-            <a:schemeClr val="dk1"/>
-          </a:lnRef>
-          <a:fillRef idx="1">
-            <a:schemeClr val="lt1"/>
-          </a:fillRef>
-          <a:effectRef idx="0">
-            <a:schemeClr val="dk1"/>
-          </a:effectRef>
-          <a:fontRef idx="minor">
-            <a:schemeClr val="dk1"/>
-          </a:fontRef>
-        </p:style>
-        <p:txBody>
-          <a:bodyPr lIns="91436" tIns="45718" rIns="91436" bIns="45718" rtlCol="0" anchor="ctr"/>
-          <a:lstStyle/>
-          <a:p>
-            <a:pPr algn="ctr"/>
-            <a:endParaRPr lang="en-US" sz="1800">
-              <a:latin typeface="CMU Serif" panose="02000603000000000000" pitchFamily="2" charset="0"/>
-              <a:ea typeface="CMU Serif" panose="02000603000000000000" pitchFamily="2" charset="0"/>
-              <a:cs typeface="CMU Serif" panose="02000603000000000000" pitchFamily="2" charset="0"/>
-            </a:endParaRPr>
-          </a:p>
-        </p:txBody>
-      </p:sp>
-      <p:sp>
-        <p:nvSpPr>
-          <p:cNvPr id="100" name="Down Arrow 99"/>
-          <p:cNvSpPr/>
-          <p:nvPr/>
-        </p:nvSpPr>
-        <p:spPr>
-          <a:xfrm rot="16200000">
-            <a:off x="6197211" y="6708579"/>
-            <a:ext cx="432048" cy="749340"/>
-          </a:xfrm>
-          <a:prstGeom prst="downArrow">
+          <a:prstGeom prst="rightArrow">
             <a:avLst/>
           </a:prstGeom>
           <a:solidFill>
-            <a:schemeClr val="accent1">
-              <a:lumMod val="60000"/>
-              <a:lumOff val="40000"/>
-            </a:schemeClr>
+            <a:srgbClr val="67A3EB"/>
           </a:solidFill>
-          <a:ln>
+          <a:ln w="19050">
             <a:solidFill>
-              <a:schemeClr val="tx2">
-                <a:lumMod val="60000"/>
-                <a:lumOff val="40000"/>
-              </a:schemeClr>
+              <a:schemeClr val="tx1"/>
             </a:solidFill>
           </a:ln>
         </p:spPr>
@@ -8539,7 +8509,7 @@
           <a:lstStyle/>
           <a:p>
             <a:pPr algn="ctr"/>
-            <a:endParaRPr lang="en-US" sz="1800">
+            <a:endParaRPr lang="en-US" sz="2000">
               <a:latin typeface="CMU Serif" panose="02000603000000000000" pitchFamily="2" charset="0"/>
               <a:ea typeface="CMU Serif" panose="02000603000000000000" pitchFamily="2" charset="0"/>
               <a:cs typeface="CMU Serif" panose="02000603000000000000" pitchFamily="2" charset="0"/>

</xml_diff>